<commit_message>
The results from thermal tests are reported. Based on the results, 10 kW/lt power density is achievable by shortening the longer edge from 134 mm to 125 mm. Thanks to powerful fan selection, there won't be any problem regarding thermal under rated conditions.
</commit_message>
<xml_diff>
--- a/Weekly Reports/2020.01.20 - 2020.01.27.pptx
+++ b/Weekly Reports/2020.01.20 - 2020.01.27.pptx
@@ -5,10 +5,14 @@
     <p:sldMasterId id="2147483648" r:id="rId1"/>
   </p:sldMasterIdLst>
   <p:notesMasterIdLst>
-    <p:notesMasterId r:id="rId3"/>
+    <p:notesMasterId r:id="rId7"/>
   </p:notesMasterIdLst>
   <p:sldIdLst>
-    <p:sldId id="277" r:id="rId2"/>
+    <p:sldId id="278" r:id="rId2"/>
+    <p:sldId id="279" r:id="rId3"/>
+    <p:sldId id="281" r:id="rId4"/>
+    <p:sldId id="280" r:id="rId5"/>
+    <p:sldId id="282" r:id="rId6"/>
   </p:sldIdLst>
   <p:sldSz cx="12192000" cy="6858000"/>
   <p:notesSz cx="6858000" cy="9144000"/>
@@ -197,7 +201,7 @@
           <a:p>
             <a:fld id="{6967AB47-6931-48C6-B7ED-326D1228AFBA}" type="datetimeFigureOut">
               <a:rPr lang="tr-TR" smtClean="0"/>
-              <a:t>21.01.2020</a:t>
+              <a:t>22.01.2020</a:t>
             </a:fld>
             <a:endParaRPr lang="tr-TR"/>
           </a:p>
@@ -596,7 +600,7 @@
           <a:p>
             <a:fld id="{BD3B3769-65FE-41EA-85B6-D9F2AF76CBA9}" type="datetime1">
               <a:rPr lang="tr-TR" smtClean="0"/>
-              <a:t>21.01.2020</a:t>
+              <a:t>22.01.2020</a:t>
             </a:fld>
             <a:endParaRPr lang="tr-TR"/>
           </a:p>
@@ -766,7 +770,7 @@
           <a:p>
             <a:fld id="{2962A6A9-D976-4BDA-B10C-66B2B9DE9B4C}" type="datetime1">
               <a:rPr lang="tr-TR" smtClean="0"/>
-              <a:t>21.01.2020</a:t>
+              <a:t>22.01.2020</a:t>
             </a:fld>
             <a:endParaRPr lang="tr-TR"/>
           </a:p>
@@ -946,7 +950,7 @@
           <a:p>
             <a:fld id="{5600552A-E4D4-4B40-9929-1D3FB71F71FF}" type="datetime1">
               <a:rPr lang="tr-TR" smtClean="0"/>
-              <a:t>21.01.2020</a:t>
+              <a:t>22.01.2020</a:t>
             </a:fld>
             <a:endParaRPr lang="tr-TR"/>
           </a:p>
@@ -1116,7 +1120,7 @@
           <a:p>
             <a:fld id="{F9A85ECC-3CE4-4AD0-8EC5-3A36763AA76F}" type="datetime1">
               <a:rPr lang="tr-TR" smtClean="0"/>
-              <a:t>21.01.2020</a:t>
+              <a:t>22.01.2020</a:t>
             </a:fld>
             <a:endParaRPr lang="tr-TR"/>
           </a:p>
@@ -1362,7 +1366,7 @@
           <a:p>
             <a:fld id="{39F6AA4B-9646-44CC-B325-B50A183D6636}" type="datetime1">
               <a:rPr lang="tr-TR" smtClean="0"/>
-              <a:t>21.01.2020</a:t>
+              <a:t>22.01.2020</a:t>
             </a:fld>
             <a:endParaRPr lang="tr-TR"/>
           </a:p>
@@ -1594,7 +1598,7 @@
           <a:p>
             <a:fld id="{FD69D89B-A78C-481C-B4BE-82E51E30BA9C}" type="datetime1">
               <a:rPr lang="tr-TR" smtClean="0"/>
-              <a:t>21.01.2020</a:t>
+              <a:t>22.01.2020</a:t>
             </a:fld>
             <a:endParaRPr lang="tr-TR"/>
           </a:p>
@@ -1961,7 +1965,7 @@
           <a:p>
             <a:fld id="{473BE270-57FE-4717-982D-F02DFB5BECD5}" type="datetime1">
               <a:rPr lang="tr-TR" smtClean="0"/>
-              <a:t>21.01.2020</a:t>
+              <a:t>22.01.2020</a:t>
             </a:fld>
             <a:endParaRPr lang="tr-TR"/>
           </a:p>
@@ -2079,7 +2083,7 @@
           <a:p>
             <a:fld id="{BFAEDD45-6991-4862-9E84-DDF92EF341CB}" type="datetime1">
               <a:rPr lang="tr-TR" smtClean="0"/>
-              <a:t>21.01.2020</a:t>
+              <a:t>22.01.2020</a:t>
             </a:fld>
             <a:endParaRPr lang="tr-TR"/>
           </a:p>
@@ -2174,7 +2178,7 @@
           <a:p>
             <a:fld id="{23EE56C6-14E9-4870-96BE-3550760A1300}" type="datetime1">
               <a:rPr lang="tr-TR" smtClean="0"/>
-              <a:t>21.01.2020</a:t>
+              <a:t>22.01.2020</a:t>
             </a:fld>
             <a:endParaRPr lang="tr-TR"/>
           </a:p>
@@ -2451,7 +2455,7 @@
           <a:p>
             <a:fld id="{5EB3015D-7E17-406D-9A1A-3B2ADCD0CF79}" type="datetime1">
               <a:rPr lang="tr-TR" smtClean="0"/>
-              <a:t>21.01.2020</a:t>
+              <a:t>22.01.2020</a:t>
             </a:fld>
             <a:endParaRPr lang="tr-TR"/>
           </a:p>
@@ -2704,7 +2708,7 @@
           <a:p>
             <a:fld id="{8E1B6673-63A0-461F-BFBD-58F4D74CC1A0}" type="datetime1">
               <a:rPr lang="tr-TR" smtClean="0"/>
-              <a:t>21.01.2020</a:t>
+              <a:t>22.01.2020</a:t>
             </a:fld>
             <a:endParaRPr lang="tr-TR"/>
           </a:p>
@@ -2917,7 +2921,7 @@
           <a:p>
             <a:fld id="{9E8EF2ED-7087-4201-9521-97BB02159B09}" type="datetime1">
               <a:rPr lang="tr-TR" smtClean="0"/>
-              <a:t>21.01.2020</a:t>
+              <a:t>22.01.2020</a:t>
             </a:fld>
             <a:endParaRPr lang="tr-TR"/>
           </a:p>
@@ -3504,15 +3508,45 @@
                   <a:srgbClr val="FF0000"/>
                 </a:solidFill>
               </a:rPr>
-              <a:t>15.87 </a:t>
-            </a:r>
+              <a:t>15.87 C/W</a:t>
+            </a:r>
+            <a:endParaRPr lang="tr-TR" dirty="0">
+              <a:solidFill>
+                <a:srgbClr val="FF0000"/>
+              </a:solidFill>
+            </a:endParaRPr>
+          </a:p>
+        </p:txBody>
+      </p:sp>
+      <p:sp>
+        <p:nvSpPr>
+          <p:cNvPr id="15" name="TextBox 14"/>
+          <p:cNvSpPr txBox="1"/>
+          <p:nvPr/>
+        </p:nvSpPr>
+        <p:spPr>
+          <a:xfrm>
+            <a:off x="5652500" y="1529511"/>
+            <a:ext cx="592730" cy="369332"/>
+          </a:xfrm>
+          <a:prstGeom prst="rect">
+            <a:avLst/>
+          </a:prstGeom>
+          <a:noFill/>
+        </p:spPr>
+        <p:txBody>
+          <a:bodyPr wrap="square" rtlCol="0">
+            <a:spAutoFit/>
+          </a:bodyPr>
+          <a:lstStyle/>
+          <a:p>
             <a:r>
               <a:rPr lang="tr-TR" dirty="0" smtClean="0">
                 <a:solidFill>
                   <a:srgbClr val="FF0000"/>
                 </a:solidFill>
               </a:rPr>
-              <a:t>C/W</a:t>
+              <a:t>20 C</a:t>
             </a:r>
             <a:endParaRPr lang="tr-TR" dirty="0">
               <a:solidFill>
@@ -3524,14 +3558,14 @@
       </p:sp>
       <p:sp>
         <p:nvSpPr>
-          <p:cNvPr id="15" name="TextBox 14"/>
+          <p:cNvPr id="16" name="TextBox 15"/>
           <p:cNvSpPr txBox="1"/>
           <p:nvPr/>
         </p:nvSpPr>
         <p:spPr>
           <a:xfrm>
-            <a:off x="5652500" y="1529511"/>
-            <a:ext cx="592730" cy="369332"/>
+            <a:off x="6424862" y="699219"/>
+            <a:ext cx="5653171" cy="5078313"/>
           </a:xfrm>
           <a:prstGeom prst="rect">
             <a:avLst/>
@@ -3545,39 +3579,131 @@
           <a:lstStyle/>
           <a:p>
             <a:r>
-              <a:rPr lang="tr-TR" dirty="0" smtClean="0">
-                <a:solidFill>
-                  <a:srgbClr val="FF0000"/>
-                </a:solidFill>
-              </a:rPr>
-              <a:t>20 </a:t>
-            </a:r>
-            <a:r>
-              <a:rPr lang="tr-TR" dirty="0" smtClean="0">
-                <a:solidFill>
-                  <a:srgbClr val="FF0000"/>
-                </a:solidFill>
-              </a:rPr>
+              <a:rPr lang="tr-TR" b="1" dirty="0" smtClean="0"/>
+              <a:t>Measured</a:t>
+            </a:r>
+          </a:p>
+          <a:p>
+            <a:r>
+              <a:rPr lang="tr-TR" i="1" u="sng" dirty="0" smtClean="0"/>
+              <a:t>90˚ rotated</a:t>
+            </a:r>
+          </a:p>
+          <a:p>
+            <a:r>
+              <a:rPr lang="tr-TR" dirty="0" smtClean="0"/>
+              <a:t>Theatsink -&gt; 76.4 C</a:t>
+            </a:r>
+          </a:p>
+          <a:p>
+            <a:r>
+              <a:rPr lang="tr-TR" dirty="0" smtClean="0"/>
+              <a:t>Vgan = 461 mV</a:t>
+            </a:r>
+          </a:p>
+          <a:p>
+            <a:r>
+              <a:rPr lang="tr-TR" dirty="0" smtClean="0"/>
+              <a:t>Igan = 7.5 A</a:t>
+            </a:r>
+          </a:p>
+          <a:p>
+            <a:r>
+              <a:rPr lang="tr-TR" dirty="0" smtClean="0"/>
+              <a:t>Ploss = 3.46 W</a:t>
+            </a:r>
+          </a:p>
+          <a:p>
+            <a:r>
+              <a:rPr lang="tr-TR" dirty="0" smtClean="0"/>
+              <a:t>Thermal resistance of HS 15.87 C/W heatsink resist.</a:t>
+            </a:r>
+          </a:p>
+          <a:p>
+            <a:endParaRPr lang="tr-TR" dirty="0"/>
+          </a:p>
+          <a:p>
+            <a:r>
+              <a:rPr lang="tr-TR" i="1" u="sng" dirty="0" smtClean="0"/>
+              <a:t>Nonrotated</a:t>
+            </a:r>
+            <a:endParaRPr lang="tr-TR" i="1" u="sng" dirty="0"/>
+          </a:p>
+          <a:p>
+            <a:r>
+              <a:rPr lang="tr-TR" dirty="0"/>
+              <a:t>Theatsink -&gt; </a:t>
+            </a:r>
+            <a:r>
+              <a:rPr lang="tr-TR" dirty="0" smtClean="0"/>
+              <a:t>74 </a:t>
+            </a:r>
+            <a:r>
+              <a:rPr lang="tr-TR" dirty="0"/>
               <a:t>C</a:t>
             </a:r>
-            <a:endParaRPr lang="tr-TR" dirty="0">
-              <a:solidFill>
-                <a:srgbClr val="FF0000"/>
-              </a:solidFill>
-            </a:endParaRPr>
-          </a:p>
-        </p:txBody>
-      </p:sp>
-      <p:sp>
-        <p:nvSpPr>
-          <p:cNvPr id="16" name="TextBox 15"/>
+          </a:p>
+          <a:p>
+            <a:r>
+              <a:rPr lang="tr-TR" dirty="0"/>
+              <a:t>Vgan = </a:t>
+            </a:r>
+            <a:r>
+              <a:rPr lang="tr-TR" dirty="0" smtClean="0"/>
+              <a:t>450.5 </a:t>
+            </a:r>
+            <a:r>
+              <a:rPr lang="tr-TR" dirty="0"/>
+              <a:t>mV</a:t>
+            </a:r>
+          </a:p>
+          <a:p>
+            <a:r>
+              <a:rPr lang="tr-TR" dirty="0"/>
+              <a:t>Igan = 7.5 A</a:t>
+            </a:r>
+          </a:p>
+          <a:p>
+            <a:r>
+              <a:rPr lang="tr-TR" dirty="0"/>
+              <a:t>Ploss = </a:t>
+            </a:r>
+            <a:r>
+              <a:rPr lang="tr-TR" dirty="0" smtClean="0"/>
+              <a:t>3.38 </a:t>
+            </a:r>
+            <a:r>
+              <a:rPr lang="tr-TR" dirty="0"/>
+              <a:t>W</a:t>
+            </a:r>
+          </a:p>
+          <a:p>
+            <a:endParaRPr lang="tr-TR" dirty="0" smtClean="0"/>
+          </a:p>
+          <a:p>
+            <a:endParaRPr lang="tr-TR" dirty="0" smtClean="0"/>
+          </a:p>
+          <a:p>
+            <a:endParaRPr lang="tr-TR" dirty="0"/>
+          </a:p>
+          <a:p>
+            <a:endParaRPr lang="tr-TR" dirty="0"/>
+          </a:p>
+          <a:p>
+            <a:endParaRPr lang="tr-TR" dirty="0" smtClean="0"/>
+          </a:p>
+        </p:txBody>
+      </p:sp>
+      <p:sp>
+        <p:nvSpPr>
+          <p:cNvPr id="14" name="TextBox 13"/>
           <p:cNvSpPr txBox="1"/>
           <p:nvPr/>
         </p:nvSpPr>
         <p:spPr>
           <a:xfrm>
-            <a:off x="6424862" y="699219"/>
-            <a:ext cx="5653171" cy="2585323"/>
+            <a:off x="263590" y="3438525"/>
+            <a:ext cx="2201837" cy="369332"/>
           </a:xfrm>
           <a:prstGeom prst="rect">
             <a:avLst/>
@@ -3591,92 +3717,23 @@
           <a:lstStyle/>
           <a:p>
             <a:r>
-              <a:rPr lang="tr-TR" b="1" dirty="0" smtClean="0"/>
-              <a:t>Measured</a:t>
-            </a:r>
-          </a:p>
-          <a:p>
-            <a:r>
               <a:rPr lang="tr-TR" dirty="0" smtClean="0"/>
-              <a:t>Theatsink -&gt; </a:t>
-            </a:r>
-            <a:r>
-              <a:rPr lang="tr-TR" dirty="0" smtClean="0"/>
-              <a:t>76.4</a:t>
-            </a:r>
-            <a:r>
-              <a:rPr lang="tr-TR" dirty="0" smtClean="0"/>
-              <a:t> </a:t>
-            </a:r>
-            <a:r>
-              <a:rPr lang="tr-TR" dirty="0" smtClean="0"/>
-              <a:t>C</a:t>
-            </a:r>
-          </a:p>
-          <a:p>
-            <a:r>
-              <a:rPr lang="tr-TR" dirty="0" smtClean="0"/>
-              <a:t>Vgan = </a:t>
-            </a:r>
-            <a:r>
-              <a:rPr lang="tr-TR" dirty="0" smtClean="0"/>
-              <a:t>461 </a:t>
-            </a:r>
-            <a:r>
-              <a:rPr lang="tr-TR" dirty="0" smtClean="0"/>
-              <a:t>mV</a:t>
-            </a:r>
-          </a:p>
-          <a:p>
-            <a:r>
-              <a:rPr lang="tr-TR" dirty="0" smtClean="0"/>
-              <a:t>Igan = 7.5 A</a:t>
-            </a:r>
-          </a:p>
-          <a:p>
-            <a:r>
-              <a:rPr lang="tr-TR" dirty="0" smtClean="0"/>
-              <a:t>Ploss = </a:t>
-            </a:r>
-            <a:r>
-              <a:rPr lang="tr-TR" dirty="0" smtClean="0"/>
-              <a:t>3.46 </a:t>
-            </a:r>
-            <a:r>
-              <a:rPr lang="tr-TR" dirty="0" smtClean="0"/>
-              <a:t>W</a:t>
-            </a:r>
-          </a:p>
-          <a:p>
-            <a:r>
-              <a:rPr lang="tr-TR" dirty="0" smtClean="0"/>
-              <a:t>Thermal resistance of HS 15.87 C/W heatsink resist.</a:t>
-            </a:r>
-          </a:p>
-          <a:p>
-            <a:r>
-              <a:rPr lang="tr-TR" dirty="0" smtClean="0"/>
-              <a:t>Estimated J. Temp = 83 C</a:t>
-            </a:r>
-          </a:p>
-          <a:p>
+              <a:t>7.5 A source current</a:t>
+            </a:r>
             <a:endParaRPr lang="tr-TR" dirty="0"/>
           </a:p>
-          <a:p>
-            <a:endParaRPr lang="tr-TR" dirty="0" smtClean="0"/>
-          </a:p>
-        </p:txBody>
-      </p:sp>
-      <p:sp>
-        <p:nvSpPr>
-          <p:cNvPr id="14" name="TextBox 13"/>
+        </p:txBody>
+      </p:sp>
+      <p:sp>
+        <p:nvSpPr>
+          <p:cNvPr id="17" name="TextBox 16"/>
           <p:cNvSpPr txBox="1"/>
           <p:nvPr/>
         </p:nvSpPr>
         <p:spPr>
           <a:xfrm>
-            <a:off x="263590" y="3438525"/>
-            <a:ext cx="2201837" cy="369332"/>
+            <a:off x="354599" y="5069835"/>
+            <a:ext cx="7717059" cy="369332"/>
           </a:xfrm>
           <a:prstGeom prst="rect">
             <a:avLst/>
@@ -3691,16 +3748,1942 @@
           <a:p>
             <a:r>
               <a:rPr lang="tr-TR" dirty="0" smtClean="0"/>
-              <a:t>7.5 A source current</a:t>
+              <a:t>Rotation does not affect the result significantly but it worsened the situation</a:t>
             </a:r>
             <a:endParaRPr lang="tr-TR" dirty="0"/>
           </a:p>
         </p:txBody>
       </p:sp>
+      <p:sp>
+        <p:nvSpPr>
+          <p:cNvPr id="5" name="Lightning Bolt 4"/>
+          <p:cNvSpPr/>
+          <p:nvPr/>
+        </p:nvSpPr>
+        <p:spPr>
+          <a:xfrm>
+            <a:off x="263590" y="4422371"/>
+            <a:ext cx="482138" cy="647464"/>
+          </a:xfrm>
+          <a:prstGeom prst="lightningBolt">
+            <a:avLst/>
+          </a:prstGeom>
+        </p:spPr>
+        <p:style>
+          <a:lnRef idx="2">
+            <a:schemeClr val="accent6">
+              <a:shade val="50000"/>
+            </a:schemeClr>
+          </a:lnRef>
+          <a:fillRef idx="1">
+            <a:schemeClr val="accent6"/>
+          </a:fillRef>
+          <a:effectRef idx="0">
+            <a:schemeClr val="accent6"/>
+          </a:effectRef>
+          <a:fontRef idx="minor">
+            <a:schemeClr val="lt1"/>
+          </a:fontRef>
+        </p:style>
+        <p:txBody>
+          <a:bodyPr rtlCol="0" anchor="ctr"/>
+          <a:lstStyle/>
+          <a:p>
+            <a:pPr algn="ctr"/>
+            <a:endParaRPr lang="tr-TR"/>
+          </a:p>
+        </p:txBody>
+      </p:sp>
+      <p:pic>
+        <p:nvPicPr>
+          <p:cNvPr id="1026" name="Picture 2" descr="emoji thinking ile ilgili görsel sonucu"/>
+          <p:cNvPicPr>
+            <a:picLocks noChangeAspect="1" noChangeArrowheads="1"/>
+          </p:cNvPicPr>
+          <p:nvPr/>
+        </p:nvPicPr>
+        <p:blipFill>
+          <a:blip r:embed="rId3" cstate="print">
+            <a:extLst>
+              <a:ext uri="{28A0092B-C50C-407E-A947-70E740481C1C}">
+                <a14:useLocalDpi xmlns:a14="http://schemas.microsoft.com/office/drawing/2010/main" val="0"/>
+              </a:ext>
+            </a:extLst>
+          </a:blip>
+          <a:srcRect/>
+          <a:stretch>
+            <a:fillRect/>
+          </a:stretch>
+        </p:blipFill>
+        <p:spPr bwMode="auto">
+          <a:xfrm>
+            <a:off x="7612402" y="4677002"/>
+            <a:ext cx="1100530" cy="1100530"/>
+          </a:xfrm>
+          <a:prstGeom prst="rect">
+            <a:avLst/>
+          </a:prstGeom>
+          <a:noFill/>
+          <a:extLst>
+            <a:ext uri="{909E8E84-426E-40DD-AFC4-6F175D3DCCD1}">
+              <a14:hiddenFill xmlns:a14="http://schemas.microsoft.com/office/drawing/2010/main">
+                <a:solidFill>
+                  <a:srgbClr val="FFFFFF"/>
+                </a:solidFill>
+              </a14:hiddenFill>
+            </a:ext>
+          </a:extLst>
+        </p:spPr>
+      </p:pic>
     </p:spTree>
     <p:extLst>
       <p:ext uri="{BB962C8B-B14F-4D97-AF65-F5344CB8AC3E}">
-        <p14:creationId xmlns:p14="http://schemas.microsoft.com/office/powerpoint/2010/main" val="164453379"/>
+        <p14:creationId xmlns:p14="http://schemas.microsoft.com/office/powerpoint/2010/main" val="4108082268"/>
+      </p:ext>
+    </p:extLst>
+  </p:cSld>
+  <p:clrMapOvr>
+    <a:masterClrMapping/>
+  </p:clrMapOvr>
+  <p:timing>
+    <p:tnLst>
+      <p:par>
+        <p:cTn id="1" dur="indefinite" restart="never" nodeType="tmRoot"/>
+      </p:par>
+    </p:tnLst>
+  </p:timing>
+</p:sld>
+</file>
+
+<file path=ppt/slides/slide2.xml><?xml version="1.0" encoding="utf-8"?>
+<p:sld xmlns:a="http://schemas.openxmlformats.org/drawingml/2006/main" xmlns:r="http://schemas.openxmlformats.org/officeDocument/2006/relationships" xmlns:p="http://schemas.openxmlformats.org/presentationml/2006/main">
+  <p:cSld>
+    <p:spTree>
+      <p:nvGrpSpPr>
+        <p:cNvPr id="1" name=""/>
+        <p:cNvGrpSpPr/>
+        <p:nvPr/>
+      </p:nvGrpSpPr>
+      <p:grpSpPr>
+        <a:xfrm>
+          <a:off x="0" y="0"/>
+          <a:ext cx="0" cy="0"/>
+          <a:chOff x="0" y="0"/>
+          <a:chExt cx="0" cy="0"/>
+        </a:xfrm>
+      </p:grpSpPr>
+      <p:pic>
+        <p:nvPicPr>
+          <p:cNvPr id="9" name="Picture 8"/>
+          <p:cNvPicPr>
+            <a:picLocks noChangeAspect="1"/>
+          </p:cNvPicPr>
+          <p:nvPr/>
+        </p:nvPicPr>
+        <p:blipFill rotWithShape="1">
+          <a:blip r:embed="rId2"/>
+          <a:srcRect l="7726" t="5822" r="8423" b="3050"/>
+          <a:stretch/>
+        </p:blipFill>
+        <p:spPr>
+          <a:xfrm>
+            <a:off x="371655" y="1048709"/>
+            <a:ext cx="5972922" cy="4019691"/>
+          </a:xfrm>
+          <a:prstGeom prst="rect">
+            <a:avLst/>
+          </a:prstGeom>
+        </p:spPr>
+      </p:pic>
+      <p:sp>
+        <p:nvSpPr>
+          <p:cNvPr id="4" name="Slide Number Placeholder 3"/>
+          <p:cNvSpPr>
+            <a:spLocks noGrp="1"/>
+          </p:cNvSpPr>
+          <p:nvPr>
+            <p:ph type="sldNum" sz="quarter" idx="12"/>
+          </p:nvPr>
+        </p:nvSpPr>
+        <p:spPr/>
+        <p:txBody>
+          <a:bodyPr/>
+          <a:lstStyle/>
+          <a:p>
+            <a:fld id="{178508F5-8E49-4F57-B165-331DE2AB85B8}" type="slidenum">
+              <a:rPr lang="tr-TR" sz="1800" smtClean="0"/>
+              <a:t>2</a:t>
+            </a:fld>
+            <a:endParaRPr lang="tr-TR" sz="1800" dirty="0"/>
+          </a:p>
+        </p:txBody>
+      </p:sp>
+      <p:sp>
+        <p:nvSpPr>
+          <p:cNvPr id="3" name="TextBox 2"/>
+          <p:cNvSpPr txBox="1"/>
+          <p:nvPr/>
+        </p:nvSpPr>
+        <p:spPr>
+          <a:xfrm>
+            <a:off x="143274" y="0"/>
+            <a:ext cx="3598145" cy="461665"/>
+          </a:xfrm>
+          <a:prstGeom prst="rect">
+            <a:avLst/>
+          </a:prstGeom>
+          <a:noFill/>
+        </p:spPr>
+        <p:txBody>
+          <a:bodyPr wrap="square" rtlCol="0">
+            <a:spAutoFit/>
+          </a:bodyPr>
+          <a:lstStyle/>
+          <a:p>
+            <a:r>
+              <a:rPr lang="tr-TR" sz="2400" b="1" dirty="0" smtClean="0"/>
+              <a:t>Thermal Tests</a:t>
+            </a:r>
+            <a:endParaRPr lang="tr-TR" sz="2400" b="1" dirty="0"/>
+          </a:p>
+        </p:txBody>
+      </p:sp>
+      <p:sp>
+        <p:nvSpPr>
+          <p:cNvPr id="17" name="TextBox 16"/>
+          <p:cNvSpPr txBox="1"/>
+          <p:nvPr/>
+        </p:nvSpPr>
+        <p:spPr>
+          <a:xfrm>
+            <a:off x="814285" y="1198850"/>
+            <a:ext cx="3975901" cy="369332"/>
+          </a:xfrm>
+          <a:prstGeom prst="rect">
+            <a:avLst/>
+          </a:prstGeom>
+          <a:noFill/>
+        </p:spPr>
+        <p:txBody>
+          <a:bodyPr wrap="square" rtlCol="0">
+            <a:spAutoFit/>
+          </a:bodyPr>
+          <a:lstStyle/>
+          <a:p>
+            <a:r>
+              <a:rPr lang="tr-TR" dirty="0" smtClean="0"/>
+              <a:t>The resistance varies with temperature</a:t>
+            </a:r>
+            <a:endParaRPr lang="tr-TR" dirty="0"/>
+          </a:p>
+        </p:txBody>
+      </p:sp>
+      <p:pic>
+        <p:nvPicPr>
+          <p:cNvPr id="8" name="Picture 7"/>
+          <p:cNvPicPr>
+            <a:picLocks noChangeAspect="1"/>
+          </p:cNvPicPr>
+          <p:nvPr/>
+        </p:nvPicPr>
+        <p:blipFill rotWithShape="1">
+          <a:blip r:embed="rId3"/>
+          <a:srcRect l="5422" t="5702" r="7702" b="917"/>
+          <a:stretch/>
+        </p:blipFill>
+        <p:spPr>
+          <a:xfrm>
+            <a:off x="6558742" y="1048708"/>
+            <a:ext cx="4932494" cy="4019691"/>
+          </a:xfrm>
+          <a:prstGeom prst="rect">
+            <a:avLst/>
+          </a:prstGeom>
+        </p:spPr>
+      </p:pic>
+      <p:sp>
+        <p:nvSpPr>
+          <p:cNvPr id="10" name="TextBox 9"/>
+          <p:cNvSpPr txBox="1"/>
+          <p:nvPr/>
+        </p:nvSpPr>
+        <p:spPr>
+          <a:xfrm>
+            <a:off x="6997530" y="1281911"/>
+            <a:ext cx="1720734" cy="1200329"/>
+          </a:xfrm>
+          <a:prstGeom prst="rect">
+            <a:avLst/>
+          </a:prstGeom>
+          <a:noFill/>
+        </p:spPr>
+        <p:txBody>
+          <a:bodyPr wrap="square" rtlCol="0">
+            <a:spAutoFit/>
+          </a:bodyPr>
+          <a:lstStyle/>
+          <a:p>
+            <a:r>
+              <a:rPr lang="tr-TR" b="1" dirty="0" smtClean="0"/>
+              <a:t>Rated Loss</a:t>
+            </a:r>
+            <a:endParaRPr lang="tr-TR" dirty="0" smtClean="0"/>
+          </a:p>
+          <a:p>
+            <a:r>
+              <a:rPr lang="tr-TR" dirty="0" smtClean="0"/>
+              <a:t>Ptop = 4.6 W</a:t>
+            </a:r>
+            <a:br>
+              <a:rPr lang="tr-TR" dirty="0" smtClean="0"/>
+            </a:br>
+            <a:r>
+              <a:rPr lang="tr-TR" dirty="0" smtClean="0"/>
+              <a:t>Pbot = 3.8 W</a:t>
+            </a:r>
+          </a:p>
+          <a:p>
+            <a:r>
+              <a:rPr lang="tr-TR" dirty="0" smtClean="0"/>
+              <a:t>Ptotal = 16.8 W</a:t>
+            </a:r>
+            <a:endParaRPr lang="tr-TR" dirty="0"/>
+          </a:p>
+        </p:txBody>
+      </p:sp>
+      <p:sp>
+        <p:nvSpPr>
+          <p:cNvPr id="18" name="TextBox 17"/>
+          <p:cNvSpPr txBox="1"/>
+          <p:nvPr/>
+        </p:nvSpPr>
+        <p:spPr>
+          <a:xfrm>
+            <a:off x="6997530" y="0"/>
+            <a:ext cx="5194470" cy="369332"/>
+          </a:xfrm>
+          <a:prstGeom prst="rect">
+            <a:avLst/>
+          </a:prstGeom>
+          <a:noFill/>
+        </p:spPr>
+        <p:txBody>
+          <a:bodyPr wrap="square" rtlCol="0">
+            <a:spAutoFit/>
+          </a:bodyPr>
+          <a:lstStyle/>
+          <a:p>
+            <a:r>
+              <a:rPr lang="tr-TR" i="1" dirty="0" smtClean="0"/>
+              <a:t>These results are valid for 6mm HS with the fan (LLB)</a:t>
+            </a:r>
+            <a:endParaRPr lang="tr-TR" i="1" dirty="0"/>
+          </a:p>
+        </p:txBody>
+      </p:sp>
+      <p:sp>
+        <p:nvSpPr>
+          <p:cNvPr id="19" name="5-Point Star 18"/>
+          <p:cNvSpPr/>
+          <p:nvPr/>
+        </p:nvSpPr>
+        <p:spPr>
+          <a:xfrm>
+            <a:off x="11312236" y="1321724"/>
+            <a:ext cx="137436" cy="199505"/>
+          </a:xfrm>
+          <a:prstGeom prst="star5">
+            <a:avLst/>
+          </a:prstGeom>
+        </p:spPr>
+        <p:style>
+          <a:lnRef idx="2">
+            <a:schemeClr val="accent2">
+              <a:shade val="50000"/>
+            </a:schemeClr>
+          </a:lnRef>
+          <a:fillRef idx="1">
+            <a:schemeClr val="accent2"/>
+          </a:fillRef>
+          <a:effectRef idx="0">
+            <a:schemeClr val="accent2"/>
+          </a:effectRef>
+          <a:fontRef idx="minor">
+            <a:schemeClr val="lt1"/>
+          </a:fontRef>
+        </p:style>
+        <p:txBody>
+          <a:bodyPr rtlCol="0" anchor="ctr"/>
+          <a:lstStyle/>
+          <a:p>
+            <a:pPr algn="ctr"/>
+            <a:endParaRPr lang="tr-TR"/>
+          </a:p>
+        </p:txBody>
+      </p:sp>
+      <p:cxnSp>
+        <p:nvCxnSpPr>
+          <p:cNvPr id="21" name="Straight Arrow Connector 20"/>
+          <p:cNvCxnSpPr/>
+          <p:nvPr/>
+        </p:nvCxnSpPr>
+        <p:spPr>
+          <a:xfrm flipV="1">
+            <a:off x="8436033" y="1421476"/>
+            <a:ext cx="2802773" cy="526169"/>
+          </a:xfrm>
+          <a:prstGeom prst="straightConnector1">
+            <a:avLst/>
+          </a:prstGeom>
+          <a:ln w="38100">
+            <a:tailEnd type="triangle"/>
+          </a:ln>
+        </p:spPr>
+        <p:style>
+          <a:lnRef idx="1">
+            <a:schemeClr val="accent2"/>
+          </a:lnRef>
+          <a:fillRef idx="0">
+            <a:schemeClr val="accent2"/>
+          </a:fillRef>
+          <a:effectRef idx="0">
+            <a:schemeClr val="accent2"/>
+          </a:effectRef>
+          <a:fontRef idx="minor">
+            <a:schemeClr val="tx1"/>
+          </a:fontRef>
+        </p:style>
+      </p:cxnSp>
+      <p:sp>
+        <p:nvSpPr>
+          <p:cNvPr id="26" name="TextBox 25"/>
+          <p:cNvSpPr txBox="1"/>
+          <p:nvPr/>
+        </p:nvSpPr>
+        <p:spPr>
+          <a:xfrm rot="20966001">
+            <a:off x="8871626" y="1663227"/>
+            <a:ext cx="2213818" cy="369332"/>
+          </a:xfrm>
+          <a:prstGeom prst="rect">
+            <a:avLst/>
+          </a:prstGeom>
+          <a:noFill/>
+        </p:spPr>
+        <p:txBody>
+          <a:bodyPr wrap="square" rtlCol="0">
+            <a:spAutoFit/>
+          </a:bodyPr>
+          <a:lstStyle/>
+          <a:p>
+            <a:r>
+              <a:rPr lang="tr-TR" dirty="0" smtClean="0"/>
+              <a:t>Similar loss is applied</a:t>
+            </a:r>
+            <a:endParaRPr lang="tr-TR" dirty="0"/>
+          </a:p>
+        </p:txBody>
+      </p:sp>
+      <p:sp>
+        <p:nvSpPr>
+          <p:cNvPr id="29" name="Down Arrow 28"/>
+          <p:cNvSpPr/>
+          <p:nvPr/>
+        </p:nvSpPr>
+        <p:spPr>
+          <a:xfrm>
+            <a:off x="9024989" y="5203767"/>
+            <a:ext cx="335142" cy="507077"/>
+          </a:xfrm>
+          <a:prstGeom prst="downArrow">
+            <a:avLst/>
+          </a:prstGeom>
+        </p:spPr>
+        <p:style>
+          <a:lnRef idx="2">
+            <a:schemeClr val="accent6">
+              <a:shade val="50000"/>
+            </a:schemeClr>
+          </a:lnRef>
+          <a:fillRef idx="1">
+            <a:schemeClr val="accent6"/>
+          </a:fillRef>
+          <a:effectRef idx="0">
+            <a:schemeClr val="accent6"/>
+          </a:effectRef>
+          <a:fontRef idx="minor">
+            <a:schemeClr val="lt1"/>
+          </a:fontRef>
+        </p:style>
+        <p:txBody>
+          <a:bodyPr rtlCol="0" anchor="ctr"/>
+          <a:lstStyle/>
+          <a:p>
+            <a:pPr algn="ctr"/>
+            <a:endParaRPr lang="tr-TR"/>
+          </a:p>
+        </p:txBody>
+      </p:sp>
+      <p:sp>
+        <p:nvSpPr>
+          <p:cNvPr id="30" name="TextBox 29"/>
+          <p:cNvSpPr txBox="1"/>
+          <p:nvPr/>
+        </p:nvSpPr>
+        <p:spPr>
+          <a:xfrm>
+            <a:off x="7305300" y="5747775"/>
+            <a:ext cx="4266016" cy="369332"/>
+          </a:xfrm>
+          <a:prstGeom prst="rect">
+            <a:avLst/>
+          </a:prstGeom>
+          <a:noFill/>
+        </p:spPr>
+        <p:txBody>
+          <a:bodyPr wrap="square" rtlCol="0">
+            <a:spAutoFit/>
+          </a:bodyPr>
+          <a:lstStyle/>
+          <a:p>
+            <a:r>
+              <a:rPr lang="tr-TR" dirty="0" smtClean="0"/>
+              <a:t>The tests are completed without a failure</a:t>
+            </a:r>
+            <a:endParaRPr lang="tr-TR" dirty="0"/>
+          </a:p>
+        </p:txBody>
+      </p:sp>
+    </p:spTree>
+    <p:extLst>
+      <p:ext uri="{BB962C8B-B14F-4D97-AF65-F5344CB8AC3E}">
+        <p14:creationId xmlns:p14="http://schemas.microsoft.com/office/powerpoint/2010/main" val="315749823"/>
+      </p:ext>
+    </p:extLst>
+  </p:cSld>
+  <p:clrMapOvr>
+    <a:masterClrMapping/>
+  </p:clrMapOvr>
+  <p:timing>
+    <p:tnLst>
+      <p:par>
+        <p:cTn id="1" dur="indefinite" restart="never" nodeType="tmRoot"/>
+      </p:par>
+    </p:tnLst>
+  </p:timing>
+</p:sld>
+</file>
+
+<file path=ppt/slides/slide3.xml><?xml version="1.0" encoding="utf-8"?>
+<p:sld xmlns:a="http://schemas.openxmlformats.org/drawingml/2006/main" xmlns:r="http://schemas.openxmlformats.org/officeDocument/2006/relationships" xmlns:p="http://schemas.openxmlformats.org/presentationml/2006/main">
+  <p:cSld>
+    <p:spTree>
+      <p:nvGrpSpPr>
+        <p:cNvPr id="1" name=""/>
+        <p:cNvGrpSpPr/>
+        <p:nvPr/>
+      </p:nvGrpSpPr>
+      <p:grpSpPr>
+        <a:xfrm>
+          <a:off x="0" y="0"/>
+          <a:ext cx="0" cy="0"/>
+          <a:chOff x="0" y="0"/>
+          <a:chExt cx="0" cy="0"/>
+        </a:xfrm>
+      </p:grpSpPr>
+      <p:pic>
+        <p:nvPicPr>
+          <p:cNvPr id="2" name="Picture 1"/>
+          <p:cNvPicPr>
+            <a:picLocks noChangeAspect="1"/>
+          </p:cNvPicPr>
+          <p:nvPr/>
+        </p:nvPicPr>
+        <p:blipFill>
+          <a:blip r:embed="rId2"/>
+          <a:stretch>
+            <a:fillRect/>
+          </a:stretch>
+        </p:blipFill>
+        <p:spPr>
+          <a:xfrm>
+            <a:off x="143274" y="896754"/>
+            <a:ext cx="6601417" cy="4087890"/>
+          </a:xfrm>
+          <a:prstGeom prst="rect">
+            <a:avLst/>
+          </a:prstGeom>
+        </p:spPr>
+      </p:pic>
+      <p:pic>
+        <p:nvPicPr>
+          <p:cNvPr id="5" name="Picture 4"/>
+          <p:cNvPicPr>
+            <a:picLocks noChangeAspect="1"/>
+          </p:cNvPicPr>
+          <p:nvPr/>
+        </p:nvPicPr>
+        <p:blipFill rotWithShape="1">
+          <a:blip r:embed="rId3"/>
+          <a:srcRect l="3316" t="5118" r="7606"/>
+          <a:stretch/>
+        </p:blipFill>
+        <p:spPr>
+          <a:xfrm>
+            <a:off x="6542117" y="1132462"/>
+            <a:ext cx="4770120" cy="3852182"/>
+          </a:xfrm>
+          <a:prstGeom prst="rect">
+            <a:avLst/>
+          </a:prstGeom>
+        </p:spPr>
+      </p:pic>
+      <p:sp>
+        <p:nvSpPr>
+          <p:cNvPr id="4" name="Slide Number Placeholder 3"/>
+          <p:cNvSpPr>
+            <a:spLocks noGrp="1"/>
+          </p:cNvSpPr>
+          <p:nvPr>
+            <p:ph type="sldNum" sz="quarter" idx="12"/>
+          </p:nvPr>
+        </p:nvSpPr>
+        <p:spPr/>
+        <p:txBody>
+          <a:bodyPr/>
+          <a:lstStyle/>
+          <a:p>
+            <a:fld id="{178508F5-8E49-4F57-B165-331DE2AB85B8}" type="slidenum">
+              <a:rPr lang="tr-TR" sz="1800" smtClean="0"/>
+              <a:t>3</a:t>
+            </a:fld>
+            <a:endParaRPr lang="tr-TR" sz="1800" dirty="0"/>
+          </a:p>
+        </p:txBody>
+      </p:sp>
+      <p:sp>
+        <p:nvSpPr>
+          <p:cNvPr id="3" name="TextBox 2"/>
+          <p:cNvSpPr txBox="1"/>
+          <p:nvPr/>
+        </p:nvSpPr>
+        <p:spPr>
+          <a:xfrm>
+            <a:off x="143274" y="0"/>
+            <a:ext cx="3598145" cy="461665"/>
+          </a:xfrm>
+          <a:prstGeom prst="rect">
+            <a:avLst/>
+          </a:prstGeom>
+          <a:noFill/>
+        </p:spPr>
+        <p:txBody>
+          <a:bodyPr wrap="square" rtlCol="0">
+            <a:spAutoFit/>
+          </a:bodyPr>
+          <a:lstStyle/>
+          <a:p>
+            <a:r>
+              <a:rPr lang="tr-TR" sz="2400" b="1" dirty="0" smtClean="0"/>
+              <a:t>Thermal Tests</a:t>
+            </a:r>
+            <a:endParaRPr lang="tr-TR" sz="2400" b="1" dirty="0"/>
+          </a:p>
+        </p:txBody>
+      </p:sp>
+      <p:sp>
+        <p:nvSpPr>
+          <p:cNvPr id="17" name="TextBox 16"/>
+          <p:cNvSpPr txBox="1"/>
+          <p:nvPr/>
+        </p:nvSpPr>
+        <p:spPr>
+          <a:xfrm>
+            <a:off x="1586154" y="4922216"/>
+            <a:ext cx="3975901" cy="369332"/>
+          </a:xfrm>
+          <a:prstGeom prst="rect">
+            <a:avLst/>
+          </a:prstGeom>
+          <a:noFill/>
+        </p:spPr>
+        <p:txBody>
+          <a:bodyPr wrap="square" rtlCol="0">
+            <a:spAutoFit/>
+          </a:bodyPr>
+          <a:lstStyle/>
+          <a:p>
+            <a:r>
+              <a:rPr lang="tr-TR" dirty="0" smtClean="0"/>
+              <a:t>Estimated thermal resistance of heatsink</a:t>
+            </a:r>
+            <a:endParaRPr lang="tr-TR" dirty="0"/>
+          </a:p>
+        </p:txBody>
+      </p:sp>
+      <p:sp>
+        <p:nvSpPr>
+          <p:cNvPr id="18" name="TextBox 17"/>
+          <p:cNvSpPr txBox="1"/>
+          <p:nvPr/>
+        </p:nvSpPr>
+        <p:spPr>
+          <a:xfrm>
+            <a:off x="6997530" y="0"/>
+            <a:ext cx="5194470" cy="369332"/>
+          </a:xfrm>
+          <a:prstGeom prst="rect">
+            <a:avLst/>
+          </a:prstGeom>
+          <a:noFill/>
+        </p:spPr>
+        <p:txBody>
+          <a:bodyPr wrap="square" rtlCol="0">
+            <a:spAutoFit/>
+          </a:bodyPr>
+          <a:lstStyle/>
+          <a:p>
+            <a:r>
+              <a:rPr lang="tr-TR" i="1" dirty="0" smtClean="0"/>
+              <a:t>These results are valid for 6mm HS with the fan (LLB)</a:t>
+            </a:r>
+            <a:endParaRPr lang="tr-TR" i="1" dirty="0"/>
+          </a:p>
+        </p:txBody>
+      </p:sp>
+      <p:sp>
+        <p:nvSpPr>
+          <p:cNvPr id="19" name="5-Point Star 18"/>
+          <p:cNvSpPr/>
+          <p:nvPr/>
+        </p:nvSpPr>
+        <p:spPr>
+          <a:xfrm>
+            <a:off x="11125754" y="1456619"/>
+            <a:ext cx="137436" cy="199505"/>
+          </a:xfrm>
+          <a:prstGeom prst="star5">
+            <a:avLst/>
+          </a:prstGeom>
+        </p:spPr>
+        <p:style>
+          <a:lnRef idx="2">
+            <a:schemeClr val="accent2">
+              <a:shade val="50000"/>
+            </a:schemeClr>
+          </a:lnRef>
+          <a:fillRef idx="1">
+            <a:schemeClr val="accent2"/>
+          </a:fillRef>
+          <a:effectRef idx="0">
+            <a:schemeClr val="accent2"/>
+          </a:effectRef>
+          <a:fontRef idx="minor">
+            <a:schemeClr val="lt1"/>
+          </a:fontRef>
+        </p:style>
+        <p:txBody>
+          <a:bodyPr rtlCol="0" anchor="ctr"/>
+          <a:lstStyle/>
+          <a:p>
+            <a:pPr algn="ctr"/>
+            <a:endParaRPr lang="tr-TR"/>
+          </a:p>
+        </p:txBody>
+      </p:sp>
+      <p:cxnSp>
+        <p:nvCxnSpPr>
+          <p:cNvPr id="21" name="Straight Arrow Connector 20"/>
+          <p:cNvCxnSpPr/>
+          <p:nvPr/>
+        </p:nvCxnSpPr>
+        <p:spPr>
+          <a:xfrm flipH="1">
+            <a:off x="9982200" y="1598996"/>
+            <a:ext cx="1094508" cy="198777"/>
+          </a:xfrm>
+          <a:prstGeom prst="straightConnector1">
+            <a:avLst/>
+          </a:prstGeom>
+          <a:ln w="38100">
+            <a:tailEnd type="triangle"/>
+          </a:ln>
+        </p:spPr>
+        <p:style>
+          <a:lnRef idx="1">
+            <a:schemeClr val="accent2"/>
+          </a:lnRef>
+          <a:fillRef idx="0">
+            <a:schemeClr val="accent2"/>
+          </a:fillRef>
+          <a:effectRef idx="0">
+            <a:schemeClr val="accent2"/>
+          </a:effectRef>
+          <a:fontRef idx="minor">
+            <a:schemeClr val="tx1"/>
+          </a:fontRef>
+        </p:style>
+      </p:cxnSp>
+      <p:sp>
+        <p:nvSpPr>
+          <p:cNvPr id="29" name="Down Arrow 28"/>
+          <p:cNvSpPr/>
+          <p:nvPr/>
+        </p:nvSpPr>
+        <p:spPr>
+          <a:xfrm rot="16200000">
+            <a:off x="4198944" y="-40911"/>
+            <a:ext cx="379798" cy="4057166"/>
+          </a:xfrm>
+          <a:prstGeom prst="downArrow">
+            <a:avLst>
+              <a:gd name="adj1" fmla="val 12172"/>
+              <a:gd name="adj2" fmla="val 102377"/>
+            </a:avLst>
+          </a:prstGeom>
+        </p:spPr>
+        <p:style>
+          <a:lnRef idx="2">
+            <a:schemeClr val="accent6">
+              <a:shade val="50000"/>
+            </a:schemeClr>
+          </a:lnRef>
+          <a:fillRef idx="1">
+            <a:schemeClr val="accent6"/>
+          </a:fillRef>
+          <a:effectRef idx="0">
+            <a:schemeClr val="accent6"/>
+          </a:effectRef>
+          <a:fontRef idx="minor">
+            <a:schemeClr val="lt1"/>
+          </a:fontRef>
+        </p:style>
+        <p:txBody>
+          <a:bodyPr rtlCol="0" anchor="ctr"/>
+          <a:lstStyle/>
+          <a:p>
+            <a:pPr algn="ctr"/>
+            <a:endParaRPr lang="tr-TR"/>
+          </a:p>
+        </p:txBody>
+      </p:sp>
+      <p:sp>
+        <p:nvSpPr>
+          <p:cNvPr id="30" name="TextBox 29"/>
+          <p:cNvSpPr txBox="1"/>
+          <p:nvPr/>
+        </p:nvSpPr>
+        <p:spPr>
+          <a:xfrm>
+            <a:off x="7087784" y="1556372"/>
+            <a:ext cx="2894416" cy="646331"/>
+          </a:xfrm>
+          <a:prstGeom prst="rect">
+            <a:avLst/>
+          </a:prstGeom>
+          <a:noFill/>
+        </p:spPr>
+        <p:txBody>
+          <a:bodyPr wrap="square" rtlCol="0">
+            <a:spAutoFit/>
+          </a:bodyPr>
+          <a:lstStyle/>
+          <a:p>
+            <a:pPr algn="ctr"/>
+            <a:r>
+              <a:rPr lang="tr-TR" dirty="0" smtClean="0"/>
+              <a:t>140˚ of junction temperature</a:t>
+            </a:r>
+          </a:p>
+          <a:p>
+            <a:pPr algn="ctr"/>
+            <a:r>
+              <a:rPr lang="tr-TR" dirty="0" smtClean="0"/>
+              <a:t>has been achieved</a:t>
+            </a:r>
+            <a:endParaRPr lang="tr-TR" dirty="0"/>
+          </a:p>
+        </p:txBody>
+      </p:sp>
+      <mc:AlternateContent xmlns:mc="http://schemas.openxmlformats.org/markup-compatibility/2006" xmlns:a14="http://schemas.microsoft.com/office/drawing/2010/main">
+        <mc:Choice Requires="a14">
+          <p:sp>
+            <p:nvSpPr>
+              <p:cNvPr id="11" name="TextBox 10"/>
+              <p:cNvSpPr txBox="1"/>
+              <p:nvPr/>
+            </p:nvSpPr>
+            <p:spPr>
+              <a:xfrm>
+                <a:off x="2008396" y="5291548"/>
+                <a:ext cx="2871171" cy="297646"/>
+              </a:xfrm>
+              <a:prstGeom prst="rect">
+                <a:avLst/>
+              </a:prstGeom>
+              <a:noFill/>
+            </p:spPr>
+            <p:txBody>
+              <a:bodyPr wrap="none" lIns="0" tIns="0" rIns="0" bIns="0" rtlCol="0">
+                <a:spAutoFit/>
+              </a:bodyPr>
+              <a:lstStyle/>
+              <a:p>
+                <a:pPr/>
+                <a14:m>
+                  <m:oMathPara xmlns:m="http://schemas.openxmlformats.org/officeDocument/2006/math">
+                    <m:oMathParaPr>
+                      <m:jc m:val="centerGroup"/>
+                    </m:oMathParaPr>
+                    <m:oMath xmlns:m="http://schemas.openxmlformats.org/officeDocument/2006/math">
+                      <m:sSub>
+                        <m:sSubPr>
+                          <m:ctrlPr>
+                            <a:rPr lang="tr-TR" b="0" i="1" smtClean="0">
+                              <a:latin typeface="Cambria Math" panose="02040503050406030204" pitchFamily="18" charset="0"/>
+                            </a:rPr>
+                          </m:ctrlPr>
+                        </m:sSubPr>
+                        <m:e>
+                          <m:r>
+                            <a:rPr lang="tr-TR" b="0" i="1" smtClean="0">
+                              <a:latin typeface="Cambria Math" panose="02040503050406030204" pitchFamily="18" charset="0"/>
+                            </a:rPr>
+                            <m:t>𝑅</m:t>
+                          </m:r>
+                        </m:e>
+                        <m:sub>
+                          <m:r>
+                            <a:rPr lang="tr-TR" b="0" i="1" smtClean="0">
+                              <a:latin typeface="Cambria Math" panose="02040503050406030204" pitchFamily="18" charset="0"/>
+                            </a:rPr>
+                            <m:t>h𝑒𝑎𝑡𝑠𝑖𝑛𝑘</m:t>
+                          </m:r>
+                        </m:sub>
+                      </m:sSub>
+                      <m:r>
+                        <a:rPr lang="tr-TR" b="0" i="1" smtClean="0">
+                          <a:latin typeface="Cambria Math" panose="02040503050406030204" pitchFamily="18" charset="0"/>
+                        </a:rPr>
+                        <m:t>=11.97∗</m:t>
+                      </m:r>
+                      <m:sSubSup>
+                        <m:sSubSupPr>
+                          <m:ctrlPr>
+                            <a:rPr lang="tr-TR" b="0" i="1" smtClean="0">
+                              <a:latin typeface="Cambria Math" panose="02040503050406030204" pitchFamily="18" charset="0"/>
+                            </a:rPr>
+                          </m:ctrlPr>
+                        </m:sSubSupPr>
+                        <m:e>
+                          <m:r>
+                            <a:rPr lang="tr-TR" b="0" i="1" smtClean="0">
+                              <a:latin typeface="Cambria Math" panose="02040503050406030204" pitchFamily="18" charset="0"/>
+                            </a:rPr>
+                            <m:t>𝑇</m:t>
+                          </m:r>
+                        </m:e>
+                        <m:sub>
+                          <m:r>
+                            <a:rPr lang="tr-TR" b="0" i="1" smtClean="0">
+                              <a:latin typeface="Cambria Math" panose="02040503050406030204" pitchFamily="18" charset="0"/>
+                            </a:rPr>
+                            <m:t>h𝑒𝑎𝑡𝑠𝑖𝑛𝑘</m:t>
+                          </m:r>
+                        </m:sub>
+                        <m:sup>
+                          <m:r>
+                            <a:rPr lang="tr-TR" b="0" i="1" smtClean="0">
+                              <a:latin typeface="Cambria Math" panose="02040503050406030204" pitchFamily="18" charset="0"/>
+                            </a:rPr>
+                            <m:t>0.356</m:t>
+                          </m:r>
+                        </m:sup>
+                      </m:sSubSup>
+                    </m:oMath>
+                  </m:oMathPara>
+                </a14:m>
+                <a:endParaRPr lang="tr-TR" b="0" dirty="0" smtClean="0"/>
+              </a:p>
+            </p:txBody>
+          </p:sp>
+        </mc:Choice>
+        <mc:Fallback xmlns="">
+          <p:sp>
+            <p:nvSpPr>
+              <p:cNvPr id="11" name="TextBox 10"/>
+              <p:cNvSpPr txBox="1">
+                <a:spLocks noRot="1" noChangeAspect="1" noMove="1" noResize="1" noEditPoints="1" noAdjustHandles="1" noChangeArrowheads="1" noChangeShapeType="1" noTextEdit="1"/>
+              </p:cNvSpPr>
+              <p:nvPr/>
+            </p:nvSpPr>
+            <p:spPr>
+              <a:xfrm>
+                <a:off x="2008396" y="5291548"/>
+                <a:ext cx="2871171" cy="297646"/>
+              </a:xfrm>
+              <a:prstGeom prst="rect">
+                <a:avLst/>
+              </a:prstGeom>
+              <a:blipFill>
+                <a:blip r:embed="rId4"/>
+                <a:stretch>
+                  <a:fillRect l="-1486" r="-637" b="-22449"/>
+                </a:stretch>
+              </a:blipFill>
+            </p:spPr>
+            <p:txBody>
+              <a:bodyPr/>
+              <a:lstStyle/>
+              <a:p>
+                <a:r>
+                  <a:rPr lang="tr-TR">
+                    <a:noFill/>
+                  </a:rPr>
+                  <a:t> </a:t>
+                </a:r>
+              </a:p>
+            </p:txBody>
+          </p:sp>
+        </mc:Fallback>
+      </mc:AlternateContent>
+    </p:spTree>
+    <p:extLst>
+      <p:ext uri="{BB962C8B-B14F-4D97-AF65-F5344CB8AC3E}">
+        <p14:creationId xmlns:p14="http://schemas.microsoft.com/office/powerpoint/2010/main" val="1867815448"/>
+      </p:ext>
+    </p:extLst>
+  </p:cSld>
+  <p:clrMapOvr>
+    <a:masterClrMapping/>
+  </p:clrMapOvr>
+  <p:timing>
+    <p:tnLst>
+      <p:par>
+        <p:cTn id="1" dur="indefinite" restart="never" nodeType="tmRoot"/>
+      </p:par>
+    </p:tnLst>
+  </p:timing>
+</p:sld>
+</file>
+
+<file path=ppt/slides/slide4.xml><?xml version="1.0" encoding="utf-8"?>
+<p:sld xmlns:a="http://schemas.openxmlformats.org/drawingml/2006/main" xmlns:r="http://schemas.openxmlformats.org/officeDocument/2006/relationships" xmlns:p="http://schemas.openxmlformats.org/presentationml/2006/main">
+  <p:cSld>
+    <p:spTree>
+      <p:nvGrpSpPr>
+        <p:cNvPr id="1" name=""/>
+        <p:cNvGrpSpPr/>
+        <p:nvPr/>
+      </p:nvGrpSpPr>
+      <p:grpSpPr>
+        <a:xfrm>
+          <a:off x="0" y="0"/>
+          <a:ext cx="0" cy="0"/>
+          <a:chOff x="0" y="0"/>
+          <a:chExt cx="0" cy="0"/>
+        </a:xfrm>
+      </p:grpSpPr>
+      <p:sp>
+        <p:nvSpPr>
+          <p:cNvPr id="4" name="Slide Number Placeholder 3"/>
+          <p:cNvSpPr>
+            <a:spLocks noGrp="1"/>
+          </p:cNvSpPr>
+          <p:nvPr>
+            <p:ph type="sldNum" sz="quarter" idx="12"/>
+          </p:nvPr>
+        </p:nvSpPr>
+        <p:spPr/>
+        <p:txBody>
+          <a:bodyPr/>
+          <a:lstStyle/>
+          <a:p>
+            <a:fld id="{178508F5-8E49-4F57-B165-331DE2AB85B8}" type="slidenum">
+              <a:rPr lang="tr-TR" sz="1800" smtClean="0"/>
+              <a:t>4</a:t>
+            </a:fld>
+            <a:endParaRPr lang="tr-TR" sz="1800" dirty="0"/>
+          </a:p>
+        </p:txBody>
+      </p:sp>
+      <p:sp>
+        <p:nvSpPr>
+          <p:cNvPr id="3" name="TextBox 2"/>
+          <p:cNvSpPr txBox="1"/>
+          <p:nvPr/>
+        </p:nvSpPr>
+        <p:spPr>
+          <a:xfrm>
+            <a:off x="143274" y="0"/>
+            <a:ext cx="3598145" cy="461665"/>
+          </a:xfrm>
+          <a:prstGeom prst="rect">
+            <a:avLst/>
+          </a:prstGeom>
+          <a:noFill/>
+        </p:spPr>
+        <p:txBody>
+          <a:bodyPr wrap="square" rtlCol="0">
+            <a:spAutoFit/>
+          </a:bodyPr>
+          <a:lstStyle/>
+          <a:p>
+            <a:r>
+              <a:rPr lang="tr-TR" sz="2400" b="1" dirty="0" smtClean="0"/>
+              <a:t>Thermal Tests</a:t>
+            </a:r>
+            <a:endParaRPr lang="tr-TR" sz="2400" b="1" dirty="0"/>
+          </a:p>
+        </p:txBody>
+      </p:sp>
+      <p:sp>
+        <p:nvSpPr>
+          <p:cNvPr id="17" name="TextBox 16"/>
+          <p:cNvSpPr txBox="1"/>
+          <p:nvPr/>
+        </p:nvSpPr>
+        <p:spPr>
+          <a:xfrm>
+            <a:off x="762354" y="5695754"/>
+            <a:ext cx="7717059" cy="369332"/>
+          </a:xfrm>
+          <a:prstGeom prst="rect">
+            <a:avLst/>
+          </a:prstGeom>
+          <a:noFill/>
+        </p:spPr>
+        <p:txBody>
+          <a:bodyPr wrap="square" rtlCol="0">
+            <a:spAutoFit/>
+          </a:bodyPr>
+          <a:lstStyle/>
+          <a:p>
+            <a:r>
+              <a:rPr lang="tr-TR" dirty="0" smtClean="0"/>
+              <a:t>Junction temperature does not affect the on-state resistance that significantly</a:t>
+            </a:r>
+            <a:endParaRPr lang="tr-TR" dirty="0"/>
+          </a:p>
+        </p:txBody>
+      </p:sp>
+      <p:sp>
+        <p:nvSpPr>
+          <p:cNvPr id="5" name="Lightning Bolt 4"/>
+          <p:cNvSpPr/>
+          <p:nvPr/>
+        </p:nvSpPr>
+        <p:spPr>
+          <a:xfrm>
+            <a:off x="371655" y="4947324"/>
+            <a:ext cx="482138" cy="647464"/>
+          </a:xfrm>
+          <a:prstGeom prst="lightningBolt">
+            <a:avLst/>
+          </a:prstGeom>
+        </p:spPr>
+        <p:style>
+          <a:lnRef idx="2">
+            <a:schemeClr val="accent6">
+              <a:shade val="50000"/>
+            </a:schemeClr>
+          </a:lnRef>
+          <a:fillRef idx="1">
+            <a:schemeClr val="accent6"/>
+          </a:fillRef>
+          <a:effectRef idx="0">
+            <a:schemeClr val="accent6"/>
+          </a:effectRef>
+          <a:fontRef idx="minor">
+            <a:schemeClr val="lt1"/>
+          </a:fontRef>
+        </p:style>
+        <p:txBody>
+          <a:bodyPr rtlCol="0" anchor="ctr"/>
+          <a:lstStyle/>
+          <a:p>
+            <a:pPr algn="ctr"/>
+            <a:endParaRPr lang="tr-TR"/>
+          </a:p>
+        </p:txBody>
+      </p:sp>
+      <p:pic>
+        <p:nvPicPr>
+          <p:cNvPr id="7" name="Picture 6"/>
+          <p:cNvPicPr>
+            <a:picLocks noChangeAspect="1"/>
+          </p:cNvPicPr>
+          <p:nvPr/>
+        </p:nvPicPr>
+        <p:blipFill rotWithShape="1">
+          <a:blip r:embed="rId2"/>
+          <a:srcRect t="16509"/>
+          <a:stretch/>
+        </p:blipFill>
+        <p:spPr>
+          <a:xfrm>
+            <a:off x="1078237" y="1106715"/>
+            <a:ext cx="4482978" cy="3840610"/>
+          </a:xfrm>
+          <a:prstGeom prst="rect">
+            <a:avLst/>
+          </a:prstGeom>
+        </p:spPr>
+      </p:pic>
+      <p:pic>
+        <p:nvPicPr>
+          <p:cNvPr id="2" name="Picture 1"/>
+          <p:cNvPicPr>
+            <a:picLocks noChangeAspect="1"/>
+          </p:cNvPicPr>
+          <p:nvPr/>
+        </p:nvPicPr>
+        <p:blipFill>
+          <a:blip r:embed="rId3"/>
+          <a:stretch>
+            <a:fillRect/>
+          </a:stretch>
+        </p:blipFill>
+        <p:spPr>
+          <a:xfrm>
+            <a:off x="6411080" y="887324"/>
+            <a:ext cx="5355001" cy="4060000"/>
+          </a:xfrm>
+          <a:prstGeom prst="rect">
+            <a:avLst/>
+          </a:prstGeom>
+        </p:spPr>
+      </p:pic>
+      <p:sp>
+        <p:nvSpPr>
+          <p:cNvPr id="8" name="Rounded Rectangle 7"/>
+          <p:cNvSpPr/>
+          <p:nvPr/>
+        </p:nvSpPr>
+        <p:spPr>
+          <a:xfrm>
+            <a:off x="3319726" y="1421476"/>
+            <a:ext cx="2391118" cy="1911928"/>
+          </a:xfrm>
+          <a:prstGeom prst="roundRect">
+            <a:avLst/>
+          </a:prstGeom>
+          <a:noFill/>
+          <a:ln w="76200">
+            <a:solidFill>
+              <a:srgbClr val="FF0000"/>
+            </a:solidFill>
+            <a:prstDash val="sysDot"/>
+          </a:ln>
+        </p:spPr>
+        <p:style>
+          <a:lnRef idx="2">
+            <a:schemeClr val="accent1">
+              <a:shade val="50000"/>
+            </a:schemeClr>
+          </a:lnRef>
+          <a:fillRef idx="1">
+            <a:schemeClr val="accent1"/>
+          </a:fillRef>
+          <a:effectRef idx="0">
+            <a:schemeClr val="accent1"/>
+          </a:effectRef>
+          <a:fontRef idx="minor">
+            <a:schemeClr val="lt1"/>
+          </a:fontRef>
+        </p:style>
+        <p:txBody>
+          <a:bodyPr rtlCol="0" anchor="ctr"/>
+          <a:lstStyle/>
+          <a:p>
+            <a:pPr algn="ctr"/>
+            <a:endParaRPr lang="tr-TR"/>
+          </a:p>
+        </p:txBody>
+      </p:sp>
+      <p:sp>
+        <p:nvSpPr>
+          <p:cNvPr id="10" name="Down Arrow 9"/>
+          <p:cNvSpPr/>
+          <p:nvPr/>
+        </p:nvSpPr>
+        <p:spPr>
+          <a:xfrm rot="16200000">
+            <a:off x="5989971" y="2367261"/>
+            <a:ext cx="335142" cy="507077"/>
+          </a:xfrm>
+          <a:prstGeom prst="downArrow">
+            <a:avLst/>
+          </a:prstGeom>
+          <a:solidFill>
+            <a:srgbClr val="FF0000"/>
+          </a:solidFill>
+        </p:spPr>
+        <p:style>
+          <a:lnRef idx="2">
+            <a:schemeClr val="accent6">
+              <a:shade val="50000"/>
+            </a:schemeClr>
+          </a:lnRef>
+          <a:fillRef idx="1">
+            <a:schemeClr val="accent6"/>
+          </a:fillRef>
+          <a:effectRef idx="0">
+            <a:schemeClr val="accent6"/>
+          </a:effectRef>
+          <a:fontRef idx="minor">
+            <a:schemeClr val="lt1"/>
+          </a:fontRef>
+        </p:style>
+        <p:txBody>
+          <a:bodyPr rtlCol="0" anchor="ctr"/>
+          <a:lstStyle/>
+          <a:p>
+            <a:pPr algn="r"/>
+            <a:endParaRPr lang="tr-TR" dirty="0"/>
+          </a:p>
+        </p:txBody>
+      </p:sp>
+    </p:spTree>
+    <p:extLst>
+      <p:ext uri="{BB962C8B-B14F-4D97-AF65-F5344CB8AC3E}">
+        <p14:creationId xmlns:p14="http://schemas.microsoft.com/office/powerpoint/2010/main" val="2770923480"/>
+      </p:ext>
+    </p:extLst>
+  </p:cSld>
+  <p:clrMapOvr>
+    <a:masterClrMapping/>
+  </p:clrMapOvr>
+  <p:timing>
+    <p:tnLst>
+      <p:par>
+        <p:cTn id="1" dur="indefinite" restart="never" nodeType="tmRoot"/>
+      </p:par>
+    </p:tnLst>
+  </p:timing>
+</p:sld>
+</file>
+
+<file path=ppt/slides/slide5.xml><?xml version="1.0" encoding="utf-8"?>
+<p:sld xmlns:a="http://schemas.openxmlformats.org/drawingml/2006/main" xmlns:r="http://schemas.openxmlformats.org/officeDocument/2006/relationships" xmlns:p="http://schemas.openxmlformats.org/presentationml/2006/main">
+  <p:cSld>
+    <p:spTree>
+      <p:nvGrpSpPr>
+        <p:cNvPr id="1" name=""/>
+        <p:cNvGrpSpPr/>
+        <p:nvPr/>
+      </p:nvGrpSpPr>
+      <p:grpSpPr>
+        <a:xfrm>
+          <a:off x="0" y="0"/>
+          <a:ext cx="0" cy="0"/>
+          <a:chOff x="0" y="0"/>
+          <a:chExt cx="0" cy="0"/>
+        </a:xfrm>
+      </p:grpSpPr>
+      <p:sp>
+        <p:nvSpPr>
+          <p:cNvPr id="4" name="Slide Number Placeholder 3"/>
+          <p:cNvSpPr>
+            <a:spLocks noGrp="1"/>
+          </p:cNvSpPr>
+          <p:nvPr>
+            <p:ph type="sldNum" sz="quarter" idx="12"/>
+          </p:nvPr>
+        </p:nvSpPr>
+        <p:spPr/>
+        <p:txBody>
+          <a:bodyPr/>
+          <a:lstStyle/>
+          <a:p>
+            <a:fld id="{178508F5-8E49-4F57-B165-331DE2AB85B8}" type="slidenum">
+              <a:rPr lang="tr-TR" sz="1800" smtClean="0"/>
+              <a:t>5</a:t>
+            </a:fld>
+            <a:endParaRPr lang="tr-TR" sz="1800" dirty="0"/>
+          </a:p>
+        </p:txBody>
+      </p:sp>
+      <p:sp>
+        <p:nvSpPr>
+          <p:cNvPr id="3" name="TextBox 2"/>
+          <p:cNvSpPr txBox="1"/>
+          <p:nvPr/>
+        </p:nvSpPr>
+        <p:spPr>
+          <a:xfrm>
+            <a:off x="143274" y="0"/>
+            <a:ext cx="3598145" cy="461665"/>
+          </a:xfrm>
+          <a:prstGeom prst="rect">
+            <a:avLst/>
+          </a:prstGeom>
+          <a:noFill/>
+        </p:spPr>
+        <p:txBody>
+          <a:bodyPr wrap="square" rtlCol="0">
+            <a:spAutoFit/>
+          </a:bodyPr>
+          <a:lstStyle/>
+          <a:p>
+            <a:r>
+              <a:rPr lang="tr-TR" sz="2400" b="1" dirty="0" smtClean="0"/>
+              <a:t>Thermal </a:t>
+            </a:r>
+            <a:r>
+              <a:rPr lang="tr-TR" sz="2400" b="1" dirty="0" smtClean="0"/>
+              <a:t>Tests - Conclusion</a:t>
+            </a:r>
+            <a:endParaRPr lang="tr-TR" sz="2400" b="1" dirty="0"/>
+          </a:p>
+        </p:txBody>
+      </p:sp>
+      <p:pic>
+        <p:nvPicPr>
+          <p:cNvPr id="9" name="Picture 8"/>
+          <p:cNvPicPr>
+            <a:picLocks noChangeAspect="1"/>
+          </p:cNvPicPr>
+          <p:nvPr/>
+        </p:nvPicPr>
+        <p:blipFill>
+          <a:blip r:embed="rId2"/>
+          <a:stretch>
+            <a:fillRect/>
+          </a:stretch>
+        </p:blipFill>
+        <p:spPr>
+          <a:xfrm>
+            <a:off x="314325" y="855925"/>
+            <a:ext cx="7433137" cy="4322730"/>
+          </a:xfrm>
+          <a:prstGeom prst="rect">
+            <a:avLst/>
+          </a:prstGeom>
+        </p:spPr>
+      </p:pic>
+      <p:cxnSp>
+        <p:nvCxnSpPr>
+          <p:cNvPr id="12" name="Straight Arrow Connector 11"/>
+          <p:cNvCxnSpPr/>
+          <p:nvPr/>
+        </p:nvCxnSpPr>
+        <p:spPr>
+          <a:xfrm flipV="1">
+            <a:off x="4197927" y="4297680"/>
+            <a:ext cx="2809702" cy="282633"/>
+          </a:xfrm>
+          <a:prstGeom prst="straightConnector1">
+            <a:avLst/>
+          </a:prstGeom>
+          <a:ln w="38100">
+            <a:solidFill>
+              <a:schemeClr val="bg1"/>
+            </a:solidFill>
+            <a:tailEnd type="triangle"/>
+          </a:ln>
+        </p:spPr>
+        <p:style>
+          <a:lnRef idx="1">
+            <a:schemeClr val="accent1"/>
+          </a:lnRef>
+          <a:fillRef idx="0">
+            <a:schemeClr val="accent1"/>
+          </a:fillRef>
+          <a:effectRef idx="0">
+            <a:schemeClr val="accent1"/>
+          </a:effectRef>
+          <a:fontRef idx="minor">
+            <a:schemeClr val="tx1"/>
+          </a:fontRef>
+        </p:style>
+      </p:cxnSp>
+      <p:cxnSp>
+        <p:nvCxnSpPr>
+          <p:cNvPr id="15" name="Straight Arrow Connector 14"/>
+          <p:cNvCxnSpPr/>
+          <p:nvPr/>
+        </p:nvCxnSpPr>
+        <p:spPr>
+          <a:xfrm>
+            <a:off x="1862051" y="2718262"/>
+            <a:ext cx="2168842" cy="1862052"/>
+          </a:xfrm>
+          <a:prstGeom prst="straightConnector1">
+            <a:avLst/>
+          </a:prstGeom>
+          <a:ln w="38100">
+            <a:solidFill>
+              <a:schemeClr val="bg1"/>
+            </a:solidFill>
+            <a:tailEnd type="triangle"/>
+          </a:ln>
+        </p:spPr>
+        <p:style>
+          <a:lnRef idx="1">
+            <a:schemeClr val="accent1"/>
+          </a:lnRef>
+          <a:fillRef idx="0">
+            <a:schemeClr val="accent1"/>
+          </a:fillRef>
+          <a:effectRef idx="0">
+            <a:schemeClr val="accent1"/>
+          </a:effectRef>
+          <a:fontRef idx="minor">
+            <a:schemeClr val="tx1"/>
+          </a:fontRef>
+        </p:style>
+      </p:cxnSp>
+      <p:cxnSp>
+        <p:nvCxnSpPr>
+          <p:cNvPr id="18" name="Straight Arrow Connector 17"/>
+          <p:cNvCxnSpPr/>
+          <p:nvPr/>
+        </p:nvCxnSpPr>
+        <p:spPr>
+          <a:xfrm flipV="1">
+            <a:off x="4089082" y="2435486"/>
+            <a:ext cx="657485" cy="1723254"/>
+          </a:xfrm>
+          <a:prstGeom prst="straightConnector1">
+            <a:avLst/>
+          </a:prstGeom>
+          <a:ln w="38100">
+            <a:solidFill>
+              <a:schemeClr val="accent4">
+                <a:lumMod val="60000"/>
+                <a:lumOff val="40000"/>
+              </a:schemeClr>
+            </a:solidFill>
+            <a:tailEnd type="triangle"/>
+          </a:ln>
+        </p:spPr>
+        <p:style>
+          <a:lnRef idx="1">
+            <a:schemeClr val="accent1"/>
+          </a:lnRef>
+          <a:fillRef idx="0">
+            <a:schemeClr val="accent1"/>
+          </a:fillRef>
+          <a:effectRef idx="0">
+            <a:schemeClr val="accent1"/>
+          </a:effectRef>
+          <a:fontRef idx="minor">
+            <a:schemeClr val="tx1"/>
+          </a:fontRef>
+        </p:style>
+      </p:cxnSp>
+      <p:cxnSp>
+        <p:nvCxnSpPr>
+          <p:cNvPr id="19" name="Straight Arrow Connector 18"/>
+          <p:cNvCxnSpPr/>
+          <p:nvPr/>
+        </p:nvCxnSpPr>
+        <p:spPr>
+          <a:xfrm flipH="1">
+            <a:off x="2427316" y="3317571"/>
+            <a:ext cx="259687" cy="705789"/>
+          </a:xfrm>
+          <a:prstGeom prst="straightConnector1">
+            <a:avLst/>
+          </a:prstGeom>
+          <a:ln w="38100">
+            <a:solidFill>
+              <a:schemeClr val="accent4">
+                <a:lumMod val="60000"/>
+                <a:lumOff val="40000"/>
+              </a:schemeClr>
+            </a:solidFill>
+            <a:tailEnd type="triangle"/>
+          </a:ln>
+        </p:spPr>
+        <p:style>
+          <a:lnRef idx="1">
+            <a:schemeClr val="accent1"/>
+          </a:lnRef>
+          <a:fillRef idx="0">
+            <a:schemeClr val="accent1"/>
+          </a:fillRef>
+          <a:effectRef idx="0">
+            <a:schemeClr val="accent1"/>
+          </a:effectRef>
+          <a:fontRef idx="minor">
+            <a:schemeClr val="tx1"/>
+          </a:fontRef>
+        </p:style>
+      </p:cxnSp>
+      <p:sp>
+        <p:nvSpPr>
+          <p:cNvPr id="22" name="TextBox 21"/>
+          <p:cNvSpPr txBox="1"/>
+          <p:nvPr/>
+        </p:nvSpPr>
+        <p:spPr>
+          <a:xfrm rot="21056075">
+            <a:off x="5498832" y="4377277"/>
+            <a:ext cx="556239" cy="382386"/>
+          </a:xfrm>
+          <a:prstGeom prst="rect">
+            <a:avLst/>
+          </a:prstGeom>
+          <a:noFill/>
+        </p:spPr>
+        <p:txBody>
+          <a:bodyPr wrap="square" rtlCol="0">
+            <a:spAutoFit/>
+          </a:bodyPr>
+          <a:lstStyle/>
+          <a:p>
+            <a:r>
+              <a:rPr lang="tr-TR" b="1" dirty="0" smtClean="0">
+                <a:solidFill>
+                  <a:schemeClr val="bg1"/>
+                </a:solidFill>
+              </a:rPr>
+              <a:t>134</a:t>
+            </a:r>
+            <a:endParaRPr lang="tr-TR" b="1" dirty="0">
+              <a:solidFill>
+                <a:schemeClr val="bg1"/>
+              </a:solidFill>
+            </a:endParaRPr>
+          </a:p>
+        </p:txBody>
+      </p:sp>
+      <p:sp>
+        <p:nvSpPr>
+          <p:cNvPr id="23" name="TextBox 22"/>
+          <p:cNvSpPr txBox="1"/>
+          <p:nvPr/>
+        </p:nvSpPr>
+        <p:spPr>
+          <a:xfrm rot="2683291">
+            <a:off x="1861036" y="2989541"/>
+            <a:ext cx="556239" cy="382386"/>
+          </a:xfrm>
+          <a:prstGeom prst="rect">
+            <a:avLst/>
+          </a:prstGeom>
+          <a:noFill/>
+        </p:spPr>
+        <p:txBody>
+          <a:bodyPr wrap="square" rtlCol="0">
+            <a:spAutoFit/>
+          </a:bodyPr>
+          <a:lstStyle/>
+          <a:p>
+            <a:r>
+              <a:rPr lang="tr-TR" b="1" dirty="0" smtClean="0">
+                <a:solidFill>
+                  <a:schemeClr val="bg1"/>
+                </a:solidFill>
+              </a:rPr>
+              <a:t>109</a:t>
+            </a:r>
+            <a:endParaRPr lang="tr-TR" b="1" dirty="0">
+              <a:solidFill>
+                <a:schemeClr val="bg1"/>
+              </a:solidFill>
+            </a:endParaRPr>
+          </a:p>
+        </p:txBody>
+      </p:sp>
+      <p:sp>
+        <p:nvSpPr>
+          <p:cNvPr id="24" name="TextBox 23"/>
+          <p:cNvSpPr txBox="1"/>
+          <p:nvPr/>
+        </p:nvSpPr>
+        <p:spPr>
+          <a:xfrm rot="17291559">
+            <a:off x="1999441" y="3464623"/>
+            <a:ext cx="739373" cy="369332"/>
+          </a:xfrm>
+          <a:prstGeom prst="rect">
+            <a:avLst/>
+          </a:prstGeom>
+          <a:noFill/>
+        </p:spPr>
+        <p:txBody>
+          <a:bodyPr wrap="square" rtlCol="0">
+            <a:spAutoFit/>
+          </a:bodyPr>
+          <a:lstStyle/>
+          <a:p>
+            <a:r>
+              <a:rPr lang="tr-TR" b="1" dirty="0" smtClean="0">
+                <a:solidFill>
+                  <a:schemeClr val="accent4">
+                    <a:lumMod val="60000"/>
+                    <a:lumOff val="40000"/>
+                  </a:schemeClr>
+                </a:solidFill>
+              </a:rPr>
+              <a:t>18.5</a:t>
+            </a:r>
+            <a:endParaRPr lang="tr-TR" b="1" dirty="0">
+              <a:solidFill>
+                <a:schemeClr val="accent4">
+                  <a:lumMod val="60000"/>
+                  <a:lumOff val="40000"/>
+                </a:schemeClr>
+              </a:solidFill>
+            </a:endParaRPr>
+          </a:p>
+        </p:txBody>
+      </p:sp>
+      <p:sp>
+        <p:nvSpPr>
+          <p:cNvPr id="26" name="TextBox 25"/>
+          <p:cNvSpPr txBox="1"/>
+          <p:nvPr/>
+        </p:nvSpPr>
+        <p:spPr>
+          <a:xfrm rot="17291559">
+            <a:off x="3984594" y="3666307"/>
+            <a:ext cx="739373" cy="369332"/>
+          </a:xfrm>
+          <a:prstGeom prst="rect">
+            <a:avLst/>
+          </a:prstGeom>
+          <a:noFill/>
+        </p:spPr>
+        <p:txBody>
+          <a:bodyPr wrap="square" rtlCol="0">
+            <a:spAutoFit/>
+          </a:bodyPr>
+          <a:lstStyle/>
+          <a:p>
+            <a:r>
+              <a:rPr lang="tr-TR" b="1" dirty="0" smtClean="0">
+                <a:solidFill>
+                  <a:schemeClr val="accent4">
+                    <a:lumMod val="60000"/>
+                    <a:lumOff val="40000"/>
+                  </a:schemeClr>
+                </a:solidFill>
+              </a:rPr>
+              <a:t>40</a:t>
+            </a:r>
+            <a:endParaRPr lang="tr-TR" b="1" dirty="0">
+              <a:solidFill>
+                <a:schemeClr val="accent4">
+                  <a:lumMod val="60000"/>
+                  <a:lumOff val="40000"/>
+                </a:schemeClr>
+              </a:solidFill>
+            </a:endParaRPr>
+          </a:p>
+        </p:txBody>
+      </p:sp>
+      <p:sp>
+        <p:nvSpPr>
+          <p:cNvPr id="27" name="TextBox 26"/>
+          <p:cNvSpPr txBox="1"/>
+          <p:nvPr/>
+        </p:nvSpPr>
+        <p:spPr>
+          <a:xfrm>
+            <a:off x="8163098" y="640080"/>
+            <a:ext cx="3374967" cy="3416320"/>
+          </a:xfrm>
+          <a:prstGeom prst="rect">
+            <a:avLst/>
+          </a:prstGeom>
+          <a:noFill/>
+        </p:spPr>
+        <p:txBody>
+          <a:bodyPr wrap="square" rtlCol="0">
+            <a:spAutoFit/>
+          </a:bodyPr>
+          <a:lstStyle/>
+          <a:p>
+            <a:r>
+              <a:rPr lang="tr-TR" b="1" dirty="0" smtClean="0"/>
+              <a:t>Version 1.0</a:t>
+            </a:r>
+          </a:p>
+          <a:p>
+            <a:r>
+              <a:rPr lang="tr-TR" dirty="0" smtClean="0"/>
+              <a:t>Volume = 0.8545 lt</a:t>
+            </a:r>
+          </a:p>
+          <a:p>
+            <a:r>
+              <a:rPr lang="tr-TR" dirty="0" smtClean="0"/>
+              <a:t>Power Denisty = 9.363 kW/lt</a:t>
+            </a:r>
+          </a:p>
+          <a:p>
+            <a:endParaRPr lang="tr-TR" dirty="0"/>
+          </a:p>
+          <a:p>
+            <a:r>
+              <a:rPr lang="tr-TR" b="1" dirty="0" smtClean="0"/>
+              <a:t>Version 1.1 – 6mm HS</a:t>
+            </a:r>
+          </a:p>
+          <a:p>
+            <a:r>
+              <a:rPr lang="tr-TR" dirty="0" smtClean="0"/>
+              <a:t>Volume = 0.7652 lt</a:t>
+            </a:r>
+          </a:p>
+          <a:p>
+            <a:r>
+              <a:rPr lang="tr-TR" dirty="0" smtClean="0"/>
+              <a:t>Power Density = 10.455 kW/lt</a:t>
+            </a:r>
+          </a:p>
+          <a:p>
+            <a:endParaRPr lang="tr-TR" dirty="0"/>
+          </a:p>
+          <a:p>
+            <a:r>
+              <a:rPr lang="tr-TR" b="1" dirty="0"/>
+              <a:t>Version 1.1 – </a:t>
+            </a:r>
+            <a:r>
+              <a:rPr lang="tr-TR" b="1" dirty="0" smtClean="0"/>
+              <a:t>10mm </a:t>
+            </a:r>
+            <a:r>
+              <a:rPr lang="tr-TR" b="1" dirty="0"/>
+              <a:t>HS</a:t>
+            </a:r>
+          </a:p>
+          <a:p>
+            <a:r>
+              <a:rPr lang="tr-TR" dirty="0"/>
+              <a:t>Volume = </a:t>
+            </a:r>
+            <a:r>
+              <a:rPr lang="tr-TR" dirty="0" smtClean="0"/>
+              <a:t>0.80901 </a:t>
+            </a:r>
+            <a:r>
+              <a:rPr lang="tr-TR" dirty="0"/>
+              <a:t>lt</a:t>
+            </a:r>
+          </a:p>
+          <a:p>
+            <a:r>
+              <a:rPr lang="tr-TR" dirty="0"/>
+              <a:t>Power Density = </a:t>
+            </a:r>
+            <a:r>
+              <a:rPr lang="tr-TR" dirty="0" smtClean="0"/>
+              <a:t>9.889 </a:t>
+            </a:r>
+            <a:r>
+              <a:rPr lang="tr-TR" dirty="0"/>
+              <a:t>kW/lt</a:t>
+            </a:r>
+          </a:p>
+          <a:p>
+            <a:endParaRPr lang="tr-TR" dirty="0"/>
+          </a:p>
+        </p:txBody>
+      </p:sp>
+      <p:sp>
+        <p:nvSpPr>
+          <p:cNvPr id="28" name="Down Arrow 27"/>
+          <p:cNvSpPr/>
+          <p:nvPr/>
+        </p:nvSpPr>
+        <p:spPr>
+          <a:xfrm>
+            <a:off x="9256659" y="3905201"/>
+            <a:ext cx="335142" cy="507077"/>
+          </a:xfrm>
+          <a:prstGeom prst="downArrow">
+            <a:avLst/>
+          </a:prstGeom>
+          <a:solidFill>
+            <a:srgbClr val="FF0000"/>
+          </a:solidFill>
+        </p:spPr>
+        <p:style>
+          <a:lnRef idx="2">
+            <a:schemeClr val="accent6">
+              <a:shade val="50000"/>
+            </a:schemeClr>
+          </a:lnRef>
+          <a:fillRef idx="1">
+            <a:schemeClr val="accent6"/>
+          </a:fillRef>
+          <a:effectRef idx="0">
+            <a:schemeClr val="accent6"/>
+          </a:effectRef>
+          <a:fontRef idx="minor">
+            <a:schemeClr val="lt1"/>
+          </a:fontRef>
+        </p:style>
+        <p:txBody>
+          <a:bodyPr rtlCol="0" anchor="ctr"/>
+          <a:lstStyle/>
+          <a:p>
+            <a:pPr algn="r"/>
+            <a:endParaRPr lang="tr-TR" dirty="0"/>
+          </a:p>
+        </p:txBody>
+      </p:sp>
+      <p:sp>
+        <p:nvSpPr>
+          <p:cNvPr id="29" name="TextBox 28"/>
+          <p:cNvSpPr txBox="1"/>
+          <p:nvPr/>
+        </p:nvSpPr>
+        <p:spPr>
+          <a:xfrm>
+            <a:off x="7981972" y="4460984"/>
+            <a:ext cx="2884516" cy="923330"/>
+          </a:xfrm>
+          <a:prstGeom prst="rect">
+            <a:avLst/>
+          </a:prstGeom>
+          <a:noFill/>
+        </p:spPr>
+        <p:txBody>
+          <a:bodyPr wrap="square" rtlCol="0">
+            <a:spAutoFit/>
+          </a:bodyPr>
+          <a:lstStyle/>
+          <a:p>
+            <a:pPr algn="ctr"/>
+            <a:r>
+              <a:rPr lang="tr-TR" b="1" dirty="0" smtClean="0"/>
+              <a:t>134 mm</a:t>
+            </a:r>
+            <a:r>
+              <a:rPr lang="tr-TR" dirty="0" smtClean="0"/>
+              <a:t> edge should be reduced </a:t>
+            </a:r>
+            <a:r>
+              <a:rPr lang="tr-TR" b="1" dirty="0" smtClean="0"/>
+              <a:t>to 125 mm </a:t>
+            </a:r>
+            <a:r>
+              <a:rPr lang="tr-TR" dirty="0" smtClean="0"/>
+              <a:t>to have </a:t>
+            </a:r>
+            <a:r>
+              <a:rPr lang="tr-TR" b="1" dirty="0" smtClean="0"/>
+              <a:t>10 kW/lt </a:t>
+            </a:r>
+            <a:r>
+              <a:rPr lang="tr-TR" dirty="0" smtClean="0"/>
+              <a:t>power density</a:t>
+            </a:r>
+            <a:endParaRPr lang="tr-TR" dirty="0"/>
+          </a:p>
+        </p:txBody>
+      </p:sp>
+    </p:spTree>
+    <p:extLst>
+      <p:ext uri="{BB962C8B-B14F-4D97-AF65-F5344CB8AC3E}">
+        <p14:creationId xmlns:p14="http://schemas.microsoft.com/office/powerpoint/2010/main" val="2003408706"/>
       </p:ext>
     </p:extLst>
   </p:cSld>

</xml_diff>

<commit_message>
Theory of operation is written for protection paper.
</commit_message>
<xml_diff>
--- a/Weekly Reports/2020.01.20 - 2020.01.27.pptx
+++ b/Weekly Reports/2020.01.20 - 2020.01.27.pptx
@@ -5,7 +5,7 @@
     <p:sldMasterId id="2147483648" r:id="rId1"/>
   </p:sldMasterIdLst>
   <p:notesMasterIdLst>
-    <p:notesMasterId r:id="rId7"/>
+    <p:notesMasterId r:id="rId9"/>
   </p:notesMasterIdLst>
   <p:sldIdLst>
     <p:sldId id="278" r:id="rId2"/>
@@ -13,6 +13,8 @@
     <p:sldId id="281" r:id="rId4"/>
     <p:sldId id="280" r:id="rId5"/>
     <p:sldId id="282" r:id="rId6"/>
+    <p:sldId id="283" r:id="rId7"/>
+    <p:sldId id="284" r:id="rId8"/>
   </p:sldIdLst>
   <p:sldSz cx="12192000" cy="6858000"/>
   <p:notesSz cx="6858000" cy="9144000"/>
@@ -201,7 +203,7 @@
           <a:p>
             <a:fld id="{6967AB47-6931-48C6-B7ED-326D1228AFBA}" type="datetimeFigureOut">
               <a:rPr lang="tr-TR" smtClean="0"/>
-              <a:t>22.01.2020</a:t>
+              <a:t>24.01.2020</a:t>
             </a:fld>
             <a:endParaRPr lang="tr-TR"/>
           </a:p>
@@ -600,7 +602,7 @@
           <a:p>
             <a:fld id="{BD3B3769-65FE-41EA-85B6-D9F2AF76CBA9}" type="datetime1">
               <a:rPr lang="tr-TR" smtClean="0"/>
-              <a:t>22.01.2020</a:t>
+              <a:t>24.01.2020</a:t>
             </a:fld>
             <a:endParaRPr lang="tr-TR"/>
           </a:p>
@@ -770,7 +772,7 @@
           <a:p>
             <a:fld id="{2962A6A9-D976-4BDA-B10C-66B2B9DE9B4C}" type="datetime1">
               <a:rPr lang="tr-TR" smtClean="0"/>
-              <a:t>22.01.2020</a:t>
+              <a:t>24.01.2020</a:t>
             </a:fld>
             <a:endParaRPr lang="tr-TR"/>
           </a:p>
@@ -950,7 +952,7 @@
           <a:p>
             <a:fld id="{5600552A-E4D4-4B40-9929-1D3FB71F71FF}" type="datetime1">
               <a:rPr lang="tr-TR" smtClean="0"/>
-              <a:t>22.01.2020</a:t>
+              <a:t>24.01.2020</a:t>
             </a:fld>
             <a:endParaRPr lang="tr-TR"/>
           </a:p>
@@ -1120,7 +1122,7 @@
           <a:p>
             <a:fld id="{F9A85ECC-3CE4-4AD0-8EC5-3A36763AA76F}" type="datetime1">
               <a:rPr lang="tr-TR" smtClean="0"/>
-              <a:t>22.01.2020</a:t>
+              <a:t>24.01.2020</a:t>
             </a:fld>
             <a:endParaRPr lang="tr-TR"/>
           </a:p>
@@ -1366,7 +1368,7 @@
           <a:p>
             <a:fld id="{39F6AA4B-9646-44CC-B325-B50A183D6636}" type="datetime1">
               <a:rPr lang="tr-TR" smtClean="0"/>
-              <a:t>22.01.2020</a:t>
+              <a:t>24.01.2020</a:t>
             </a:fld>
             <a:endParaRPr lang="tr-TR"/>
           </a:p>
@@ -1598,7 +1600,7 @@
           <a:p>
             <a:fld id="{FD69D89B-A78C-481C-B4BE-82E51E30BA9C}" type="datetime1">
               <a:rPr lang="tr-TR" smtClean="0"/>
-              <a:t>22.01.2020</a:t>
+              <a:t>24.01.2020</a:t>
             </a:fld>
             <a:endParaRPr lang="tr-TR"/>
           </a:p>
@@ -1965,7 +1967,7 @@
           <a:p>
             <a:fld id="{473BE270-57FE-4717-982D-F02DFB5BECD5}" type="datetime1">
               <a:rPr lang="tr-TR" smtClean="0"/>
-              <a:t>22.01.2020</a:t>
+              <a:t>24.01.2020</a:t>
             </a:fld>
             <a:endParaRPr lang="tr-TR"/>
           </a:p>
@@ -2083,7 +2085,7 @@
           <a:p>
             <a:fld id="{BFAEDD45-6991-4862-9E84-DDF92EF341CB}" type="datetime1">
               <a:rPr lang="tr-TR" smtClean="0"/>
-              <a:t>22.01.2020</a:t>
+              <a:t>24.01.2020</a:t>
             </a:fld>
             <a:endParaRPr lang="tr-TR"/>
           </a:p>
@@ -2178,7 +2180,7 @@
           <a:p>
             <a:fld id="{23EE56C6-14E9-4870-96BE-3550760A1300}" type="datetime1">
               <a:rPr lang="tr-TR" smtClean="0"/>
-              <a:t>22.01.2020</a:t>
+              <a:t>24.01.2020</a:t>
             </a:fld>
             <a:endParaRPr lang="tr-TR"/>
           </a:p>
@@ -2455,7 +2457,7 @@
           <a:p>
             <a:fld id="{5EB3015D-7E17-406D-9A1A-3B2ADCD0CF79}" type="datetime1">
               <a:rPr lang="tr-TR" smtClean="0"/>
-              <a:t>22.01.2020</a:t>
+              <a:t>24.01.2020</a:t>
             </a:fld>
             <a:endParaRPr lang="tr-TR"/>
           </a:p>
@@ -2708,7 +2710,7 @@
           <a:p>
             <a:fld id="{8E1B6673-63A0-461F-BFBD-58F4D74CC1A0}" type="datetime1">
               <a:rPr lang="tr-TR" smtClean="0"/>
-              <a:t>22.01.2020</a:t>
+              <a:t>24.01.2020</a:t>
             </a:fld>
             <a:endParaRPr lang="tr-TR"/>
           </a:p>
@@ -2921,7 +2923,7 @@
           <a:p>
             <a:fld id="{9E8EF2ED-7087-4201-9521-97BB02159B09}" type="datetime1">
               <a:rPr lang="tr-TR" smtClean="0"/>
-              <a:t>22.01.2020</a:t>
+              <a:t>24.01.2020</a:t>
             </a:fld>
             <a:endParaRPr lang="tr-TR"/>
           </a:p>
@@ -5128,11 +5130,7 @@
           <a:p>
             <a:r>
               <a:rPr lang="tr-TR" sz="2400" b="1" dirty="0" smtClean="0"/>
-              <a:t>Thermal </a:t>
-            </a:r>
-            <a:r>
-              <a:rPr lang="tr-TR" sz="2400" b="1" dirty="0" smtClean="0"/>
-              <a:t>Tests - Conclusion</a:t>
+              <a:t>Thermal Tests - Conclusion</a:t>
             </a:r>
             <a:endParaRPr lang="tr-TR" sz="2400" b="1" dirty="0"/>
           </a:p>
@@ -5684,6 +5682,1360 @@
     <p:extLst>
       <p:ext uri="{BB962C8B-B14F-4D97-AF65-F5344CB8AC3E}">
         <p14:creationId xmlns:p14="http://schemas.microsoft.com/office/powerpoint/2010/main" val="2003408706"/>
+      </p:ext>
+    </p:extLst>
+  </p:cSld>
+  <p:clrMapOvr>
+    <a:masterClrMapping/>
+  </p:clrMapOvr>
+  <p:timing>
+    <p:tnLst>
+      <p:par>
+        <p:cTn id="1" dur="indefinite" restart="never" nodeType="tmRoot"/>
+      </p:par>
+    </p:tnLst>
+  </p:timing>
+</p:sld>
+</file>
+
+<file path=ppt/slides/slide6.xml><?xml version="1.0" encoding="utf-8"?>
+<p:sld xmlns:a="http://schemas.openxmlformats.org/drawingml/2006/main" xmlns:r="http://schemas.openxmlformats.org/officeDocument/2006/relationships" xmlns:p="http://schemas.openxmlformats.org/presentationml/2006/main">
+  <p:cSld>
+    <p:spTree>
+      <p:nvGrpSpPr>
+        <p:cNvPr id="1" name=""/>
+        <p:cNvGrpSpPr/>
+        <p:nvPr/>
+      </p:nvGrpSpPr>
+      <p:grpSpPr>
+        <a:xfrm>
+          <a:off x="0" y="0"/>
+          <a:ext cx="0" cy="0"/>
+          <a:chOff x="0" y="0"/>
+          <a:chExt cx="0" cy="0"/>
+        </a:xfrm>
+      </p:grpSpPr>
+      <p:sp>
+        <p:nvSpPr>
+          <p:cNvPr id="4" name="Slide Number Placeholder 3"/>
+          <p:cNvSpPr>
+            <a:spLocks noGrp="1"/>
+          </p:cNvSpPr>
+          <p:nvPr>
+            <p:ph type="sldNum" sz="quarter" idx="12"/>
+          </p:nvPr>
+        </p:nvSpPr>
+        <p:spPr/>
+        <p:txBody>
+          <a:bodyPr/>
+          <a:lstStyle/>
+          <a:p>
+            <a:fld id="{178508F5-8E49-4F57-B165-331DE2AB85B8}" type="slidenum">
+              <a:rPr lang="tr-TR" sz="1800" smtClean="0"/>
+              <a:t>6</a:t>
+            </a:fld>
+            <a:endParaRPr lang="tr-TR" sz="1800" dirty="0"/>
+          </a:p>
+        </p:txBody>
+      </p:sp>
+      <p:sp>
+        <p:nvSpPr>
+          <p:cNvPr id="3" name="TextBox 2"/>
+          <p:cNvSpPr txBox="1"/>
+          <p:nvPr/>
+        </p:nvSpPr>
+        <p:spPr>
+          <a:xfrm>
+            <a:off x="218088" y="93529"/>
+            <a:ext cx="4461977" cy="461665"/>
+          </a:xfrm>
+          <a:prstGeom prst="rect">
+            <a:avLst/>
+          </a:prstGeom>
+          <a:noFill/>
+        </p:spPr>
+        <p:txBody>
+          <a:bodyPr wrap="square" rtlCol="0">
+            <a:spAutoFit/>
+          </a:bodyPr>
+          <a:lstStyle/>
+          <a:p>
+            <a:r>
+              <a:rPr lang="tr-TR" sz="2400" b="1" dirty="0" smtClean="0"/>
+              <a:t>Analog Voltage Measurements</a:t>
+            </a:r>
+            <a:endParaRPr lang="tr-TR" sz="2400" b="1" dirty="0"/>
+          </a:p>
+        </p:txBody>
+      </p:sp>
+      <p:graphicFrame>
+        <p:nvGraphicFramePr>
+          <p:cNvPr id="2" name="Table 1"/>
+          <p:cNvGraphicFramePr>
+            <a:graphicFrameLocks noGrp="1"/>
+          </p:cNvGraphicFramePr>
+          <p:nvPr>
+            <p:extLst>
+              <p:ext uri="{D42A27DB-BD31-4B8C-83A1-F6EECF244321}">
+                <p14:modId xmlns:p14="http://schemas.microsoft.com/office/powerpoint/2010/main" val="3061597768"/>
+              </p:ext>
+            </p:extLst>
+          </p:nvPr>
+        </p:nvGraphicFramePr>
+        <p:xfrm>
+          <a:off x="457201" y="744604"/>
+          <a:ext cx="3537940" cy="2225040"/>
+        </p:xfrm>
+        <a:graphic>
+          <a:graphicData uri="http://schemas.openxmlformats.org/drawingml/2006/table">
+            <a:tbl>
+              <a:tblPr firstRow="1" bandRow="1">
+                <a:tableStyleId>{5C22544A-7EE6-4342-B048-85BDC9FD1C3A}</a:tableStyleId>
+              </a:tblPr>
+              <a:tblGrid>
+                <a:gridCol w="938530">
+                  <a:extLst>
+                    <a:ext uri="{9D8B030D-6E8A-4147-A177-3AD203B41FA5}">
+                      <a16:colId xmlns:a16="http://schemas.microsoft.com/office/drawing/2014/main" val="2942139392"/>
+                    </a:ext>
+                  </a:extLst>
+                </a:gridCol>
+                <a:gridCol w="1133793">
+                  <a:extLst>
+                    <a:ext uri="{9D8B030D-6E8A-4147-A177-3AD203B41FA5}">
+                      <a16:colId xmlns:a16="http://schemas.microsoft.com/office/drawing/2014/main" val="679256591"/>
+                    </a:ext>
+                  </a:extLst>
+                </a:gridCol>
+                <a:gridCol w="1465617">
+                  <a:extLst>
+                    <a:ext uri="{9D8B030D-6E8A-4147-A177-3AD203B41FA5}">
+                      <a16:colId xmlns:a16="http://schemas.microsoft.com/office/drawing/2014/main" val="3785696837"/>
+                    </a:ext>
+                  </a:extLst>
+                </a:gridCol>
+              </a:tblGrid>
+              <a:tr h="370840">
+                <a:tc gridSpan="3">
+                  <a:txBody>
+                    <a:bodyPr/>
+                    <a:lstStyle/>
+                    <a:p>
+                      <a:pPr algn="ctr"/>
+                      <a:r>
+                        <a:rPr lang="tr-TR" dirty="0" smtClean="0"/>
+                        <a:t>Input</a:t>
+                      </a:r>
+                      <a:r>
+                        <a:rPr lang="tr-TR" baseline="0" dirty="0" smtClean="0"/>
+                        <a:t> Voltage</a:t>
+                      </a:r>
+                      <a:endParaRPr lang="tr-TR" dirty="0"/>
+                    </a:p>
+                  </a:txBody>
+                  <a:tcPr/>
+                </a:tc>
+                <a:tc hMerge="1">
+                  <a:txBody>
+                    <a:bodyPr/>
+                    <a:lstStyle/>
+                    <a:p>
+                      <a:endParaRPr lang="tr-TR" dirty="0"/>
+                    </a:p>
+                  </a:txBody>
+                  <a:tcPr/>
+                </a:tc>
+                <a:tc hMerge="1">
+                  <a:txBody>
+                    <a:bodyPr/>
+                    <a:lstStyle/>
+                    <a:p>
+                      <a:endParaRPr lang="tr-TR" dirty="0"/>
+                    </a:p>
+                  </a:txBody>
+                  <a:tcPr/>
+                </a:tc>
+                <a:extLst>
+                  <a:ext uri="{0D108BD9-81ED-4DB2-BD59-A6C34878D82A}">
+                    <a16:rowId xmlns:a16="http://schemas.microsoft.com/office/drawing/2014/main" val="155744962"/>
+                  </a:ext>
+                </a:extLst>
+              </a:tr>
+              <a:tr h="370840">
+                <a:tc>
+                  <a:txBody>
+                    <a:bodyPr/>
+                    <a:lstStyle/>
+                    <a:p>
+                      <a:r>
+                        <a:rPr lang="tr-TR" dirty="0" smtClean="0"/>
+                        <a:t>V</a:t>
+                      </a:r>
+                      <a:r>
+                        <a:rPr lang="tr-TR" baseline="-25000" dirty="0" smtClean="0"/>
+                        <a:t>DC</a:t>
+                      </a:r>
+                      <a:endParaRPr lang="tr-TR" baseline="-25000" dirty="0"/>
+                    </a:p>
+                  </a:txBody>
+                  <a:tcPr/>
+                </a:tc>
+                <a:tc>
+                  <a:txBody>
+                    <a:bodyPr/>
+                    <a:lstStyle/>
+                    <a:p>
+                      <a:r>
+                        <a:rPr lang="tr-TR" dirty="0" smtClean="0"/>
+                        <a:t>V</a:t>
+                      </a:r>
+                      <a:r>
+                        <a:rPr lang="tr-TR" baseline="-25000" dirty="0" smtClean="0"/>
+                        <a:t>amp,out</a:t>
+                      </a:r>
+                      <a:endParaRPr lang="tr-TR" baseline="-25000" dirty="0"/>
+                    </a:p>
+                  </a:txBody>
+                  <a:tcPr/>
+                </a:tc>
+                <a:tc>
+                  <a:txBody>
+                    <a:bodyPr/>
+                    <a:lstStyle/>
+                    <a:p>
+                      <a:r>
+                        <a:rPr lang="tr-TR" dirty="0" smtClean="0"/>
+                        <a:t>DSP</a:t>
+                      </a:r>
+                      <a:endParaRPr lang="tr-TR" dirty="0"/>
+                    </a:p>
+                  </a:txBody>
+                  <a:tcPr/>
+                </a:tc>
+                <a:extLst>
+                  <a:ext uri="{0D108BD9-81ED-4DB2-BD59-A6C34878D82A}">
+                    <a16:rowId xmlns:a16="http://schemas.microsoft.com/office/drawing/2014/main" val="237001104"/>
+                  </a:ext>
+                </a:extLst>
+              </a:tr>
+              <a:tr h="370840">
+                <a:tc>
+                  <a:txBody>
+                    <a:bodyPr/>
+                    <a:lstStyle/>
+                    <a:p>
+                      <a:r>
+                        <a:rPr lang="tr-TR" dirty="0" smtClean="0"/>
+                        <a:t>51.7 V</a:t>
+                      </a:r>
+                      <a:endParaRPr lang="tr-TR" dirty="0"/>
+                    </a:p>
+                  </a:txBody>
+                  <a:tcPr/>
+                </a:tc>
+                <a:tc>
+                  <a:txBody>
+                    <a:bodyPr/>
+                    <a:lstStyle/>
+                    <a:p>
+                      <a:r>
+                        <a:rPr lang="tr-TR" dirty="0" smtClean="0"/>
+                        <a:t>-263 mV</a:t>
+                      </a:r>
+                      <a:endParaRPr lang="tr-TR" dirty="0"/>
+                    </a:p>
+                  </a:txBody>
+                  <a:tcPr/>
+                </a:tc>
+                <a:tc>
+                  <a:txBody>
+                    <a:bodyPr/>
+                    <a:lstStyle/>
+                    <a:p>
+                      <a:r>
+                        <a:rPr lang="tr-TR" dirty="0" smtClean="0"/>
+                        <a:t>-25V ± 3</a:t>
+                      </a:r>
+                      <a:endParaRPr lang="tr-TR" dirty="0"/>
+                    </a:p>
+                  </a:txBody>
+                  <a:tcPr/>
+                </a:tc>
+                <a:extLst>
+                  <a:ext uri="{0D108BD9-81ED-4DB2-BD59-A6C34878D82A}">
+                    <a16:rowId xmlns:a16="http://schemas.microsoft.com/office/drawing/2014/main" val="1754641669"/>
+                  </a:ext>
+                </a:extLst>
+              </a:tr>
+              <a:tr h="370840">
+                <a:tc>
+                  <a:txBody>
+                    <a:bodyPr/>
+                    <a:lstStyle/>
+                    <a:p>
+                      <a:r>
+                        <a:rPr lang="tr-TR" dirty="0" smtClean="0"/>
+                        <a:t>100.9 V</a:t>
+                      </a:r>
+                      <a:endParaRPr lang="tr-TR" dirty="0"/>
+                    </a:p>
+                  </a:txBody>
+                  <a:tcPr/>
+                </a:tc>
+                <a:tc>
+                  <a:txBody>
+                    <a:bodyPr/>
+                    <a:lstStyle/>
+                    <a:p>
+                      <a:r>
+                        <a:rPr lang="tr-TR" dirty="0" smtClean="0"/>
+                        <a:t>-505 mV</a:t>
+                      </a:r>
+                      <a:endParaRPr lang="tr-TR" dirty="0"/>
+                    </a:p>
+                  </a:txBody>
+                  <a:tcPr/>
+                </a:tc>
+                <a:tc>
+                  <a:txBody>
+                    <a:bodyPr/>
+                    <a:lstStyle/>
+                    <a:p>
+                      <a:r>
+                        <a:rPr lang="tr-TR" dirty="0" smtClean="0"/>
+                        <a:t>-48V </a:t>
+                      </a:r>
+                      <a:r>
+                        <a:rPr lang="tr-TR" dirty="0" smtClean="0"/>
+                        <a:t>± 2.5</a:t>
+                      </a:r>
+                      <a:endParaRPr lang="tr-TR" dirty="0"/>
+                    </a:p>
+                  </a:txBody>
+                  <a:tcPr/>
+                </a:tc>
+                <a:extLst>
+                  <a:ext uri="{0D108BD9-81ED-4DB2-BD59-A6C34878D82A}">
+                    <a16:rowId xmlns:a16="http://schemas.microsoft.com/office/drawing/2014/main" val="2063700647"/>
+                  </a:ext>
+                </a:extLst>
+              </a:tr>
+              <a:tr h="370840">
+                <a:tc>
+                  <a:txBody>
+                    <a:bodyPr/>
+                    <a:lstStyle/>
+                    <a:p>
+                      <a:r>
+                        <a:rPr lang="tr-TR" dirty="0" smtClean="0"/>
+                        <a:t>150.7 V</a:t>
+                      </a:r>
+                      <a:endParaRPr lang="tr-TR" dirty="0"/>
+                    </a:p>
+                  </a:txBody>
+                  <a:tcPr/>
+                </a:tc>
+                <a:tc>
+                  <a:txBody>
+                    <a:bodyPr/>
+                    <a:lstStyle/>
+                    <a:p>
+                      <a:r>
+                        <a:rPr lang="tr-TR" dirty="0" smtClean="0"/>
+                        <a:t>-760</a:t>
+                      </a:r>
+                      <a:r>
+                        <a:rPr lang="tr-TR" baseline="0" dirty="0" smtClean="0"/>
+                        <a:t> mV</a:t>
+                      </a:r>
+                      <a:endParaRPr lang="tr-TR" dirty="0"/>
+                    </a:p>
+                  </a:txBody>
+                  <a:tcPr/>
+                </a:tc>
+                <a:tc>
+                  <a:txBody>
+                    <a:bodyPr/>
+                    <a:lstStyle/>
+                    <a:p>
+                      <a:r>
+                        <a:rPr lang="tr-TR" dirty="0" smtClean="0"/>
+                        <a:t>-72V </a:t>
+                      </a:r>
+                      <a:r>
+                        <a:rPr lang="tr-TR" dirty="0" smtClean="0"/>
+                        <a:t>± 2</a:t>
+                      </a:r>
+                      <a:endParaRPr lang="tr-TR" dirty="0"/>
+                    </a:p>
+                  </a:txBody>
+                  <a:tcPr/>
+                </a:tc>
+                <a:extLst>
+                  <a:ext uri="{0D108BD9-81ED-4DB2-BD59-A6C34878D82A}">
+                    <a16:rowId xmlns:a16="http://schemas.microsoft.com/office/drawing/2014/main" val="2242178881"/>
+                  </a:ext>
+                </a:extLst>
+              </a:tr>
+              <a:tr h="370840">
+                <a:tc>
+                  <a:txBody>
+                    <a:bodyPr/>
+                    <a:lstStyle/>
+                    <a:p>
+                      <a:r>
+                        <a:rPr lang="tr-TR" dirty="0" smtClean="0"/>
+                        <a:t>201.7</a:t>
+                      </a:r>
+                      <a:endParaRPr lang="tr-TR" dirty="0"/>
+                    </a:p>
+                  </a:txBody>
+                  <a:tcPr/>
+                </a:tc>
+                <a:tc>
+                  <a:txBody>
+                    <a:bodyPr/>
+                    <a:lstStyle/>
+                    <a:p>
+                      <a:r>
+                        <a:rPr lang="tr-TR" dirty="0" smtClean="0"/>
+                        <a:t>-1017 mV</a:t>
+                      </a:r>
+                      <a:endParaRPr lang="tr-TR" dirty="0"/>
+                    </a:p>
+                  </a:txBody>
+                  <a:tcPr/>
+                </a:tc>
+                <a:tc>
+                  <a:txBody>
+                    <a:bodyPr/>
+                    <a:lstStyle/>
+                    <a:p>
+                      <a:r>
+                        <a:rPr lang="tr-TR" dirty="0" smtClean="0"/>
+                        <a:t>-98V </a:t>
+                      </a:r>
+                      <a:r>
+                        <a:rPr lang="tr-TR" dirty="0" smtClean="0"/>
+                        <a:t>± 3</a:t>
+                      </a:r>
+                      <a:endParaRPr lang="tr-TR" dirty="0"/>
+                    </a:p>
+                  </a:txBody>
+                  <a:tcPr/>
+                </a:tc>
+                <a:extLst>
+                  <a:ext uri="{0D108BD9-81ED-4DB2-BD59-A6C34878D82A}">
+                    <a16:rowId xmlns:a16="http://schemas.microsoft.com/office/drawing/2014/main" val="3857915851"/>
+                  </a:ext>
+                </a:extLst>
+              </a:tr>
+            </a:tbl>
+          </a:graphicData>
+        </a:graphic>
+      </p:graphicFrame>
+      <p:graphicFrame>
+        <p:nvGraphicFramePr>
+          <p:cNvPr id="17" name="Table 16"/>
+          <p:cNvGraphicFramePr>
+            <a:graphicFrameLocks noGrp="1"/>
+          </p:cNvGraphicFramePr>
+          <p:nvPr>
+            <p:extLst>
+              <p:ext uri="{D42A27DB-BD31-4B8C-83A1-F6EECF244321}">
+                <p14:modId xmlns:p14="http://schemas.microsoft.com/office/powerpoint/2010/main" val="994697162"/>
+              </p:ext>
+            </p:extLst>
+          </p:nvPr>
+        </p:nvGraphicFramePr>
+        <p:xfrm>
+          <a:off x="457201" y="3810129"/>
+          <a:ext cx="3537940" cy="2225040"/>
+        </p:xfrm>
+        <a:graphic>
+          <a:graphicData uri="http://schemas.openxmlformats.org/drawingml/2006/table">
+            <a:tbl>
+              <a:tblPr firstRow="1" bandRow="1">
+                <a:tableStyleId>{5C22544A-7EE6-4342-B048-85BDC9FD1C3A}</a:tableStyleId>
+              </a:tblPr>
+              <a:tblGrid>
+                <a:gridCol w="938530">
+                  <a:extLst>
+                    <a:ext uri="{9D8B030D-6E8A-4147-A177-3AD203B41FA5}">
+                      <a16:colId xmlns:a16="http://schemas.microsoft.com/office/drawing/2014/main" val="2942139392"/>
+                    </a:ext>
+                  </a:extLst>
+                </a:gridCol>
+                <a:gridCol w="1133793">
+                  <a:extLst>
+                    <a:ext uri="{9D8B030D-6E8A-4147-A177-3AD203B41FA5}">
+                      <a16:colId xmlns:a16="http://schemas.microsoft.com/office/drawing/2014/main" val="679256591"/>
+                    </a:ext>
+                  </a:extLst>
+                </a:gridCol>
+                <a:gridCol w="1465617">
+                  <a:extLst>
+                    <a:ext uri="{9D8B030D-6E8A-4147-A177-3AD203B41FA5}">
+                      <a16:colId xmlns:a16="http://schemas.microsoft.com/office/drawing/2014/main" val="3785696837"/>
+                    </a:ext>
+                  </a:extLst>
+                </a:gridCol>
+              </a:tblGrid>
+              <a:tr h="370840">
+                <a:tc gridSpan="3">
+                  <a:txBody>
+                    <a:bodyPr/>
+                    <a:lstStyle/>
+                    <a:p>
+                      <a:pPr algn="ctr"/>
+                      <a:r>
+                        <a:rPr lang="tr-TR" dirty="0" smtClean="0"/>
+                        <a:t>Output</a:t>
+                      </a:r>
+                      <a:r>
+                        <a:rPr lang="tr-TR" baseline="0" dirty="0" smtClean="0"/>
+                        <a:t> Voltage</a:t>
+                      </a:r>
+                      <a:endParaRPr lang="tr-TR" dirty="0"/>
+                    </a:p>
+                  </a:txBody>
+                  <a:tcPr/>
+                </a:tc>
+                <a:tc hMerge="1">
+                  <a:txBody>
+                    <a:bodyPr/>
+                    <a:lstStyle/>
+                    <a:p>
+                      <a:endParaRPr lang="tr-TR" dirty="0"/>
+                    </a:p>
+                  </a:txBody>
+                  <a:tcPr/>
+                </a:tc>
+                <a:tc hMerge="1">
+                  <a:txBody>
+                    <a:bodyPr/>
+                    <a:lstStyle/>
+                    <a:p>
+                      <a:endParaRPr lang="tr-TR" dirty="0"/>
+                    </a:p>
+                  </a:txBody>
+                  <a:tcPr/>
+                </a:tc>
+                <a:extLst>
+                  <a:ext uri="{0D108BD9-81ED-4DB2-BD59-A6C34878D82A}">
+                    <a16:rowId xmlns:a16="http://schemas.microsoft.com/office/drawing/2014/main" val="155744962"/>
+                  </a:ext>
+                </a:extLst>
+              </a:tr>
+              <a:tr h="370840">
+                <a:tc>
+                  <a:txBody>
+                    <a:bodyPr/>
+                    <a:lstStyle/>
+                    <a:p>
+                      <a:r>
+                        <a:rPr lang="tr-TR" dirty="0" smtClean="0"/>
+                        <a:t>V</a:t>
+                      </a:r>
+                      <a:r>
+                        <a:rPr lang="tr-TR" baseline="-25000" dirty="0" smtClean="0"/>
+                        <a:t>DC</a:t>
+                      </a:r>
+                      <a:endParaRPr lang="tr-TR" baseline="-25000" dirty="0"/>
+                    </a:p>
+                  </a:txBody>
+                  <a:tcPr/>
+                </a:tc>
+                <a:tc>
+                  <a:txBody>
+                    <a:bodyPr/>
+                    <a:lstStyle/>
+                    <a:p>
+                      <a:r>
+                        <a:rPr lang="tr-TR" dirty="0" smtClean="0"/>
+                        <a:t>V</a:t>
+                      </a:r>
+                      <a:r>
+                        <a:rPr lang="tr-TR" baseline="-25000" dirty="0" smtClean="0"/>
+                        <a:t>amp,out</a:t>
+                      </a:r>
+                      <a:endParaRPr lang="tr-TR" baseline="-25000" dirty="0"/>
+                    </a:p>
+                  </a:txBody>
+                  <a:tcPr/>
+                </a:tc>
+                <a:tc>
+                  <a:txBody>
+                    <a:bodyPr/>
+                    <a:lstStyle/>
+                    <a:p>
+                      <a:r>
+                        <a:rPr lang="tr-TR" dirty="0" smtClean="0"/>
+                        <a:t>DSP</a:t>
+                      </a:r>
+                      <a:endParaRPr lang="tr-TR" dirty="0"/>
+                    </a:p>
+                  </a:txBody>
+                  <a:tcPr/>
+                </a:tc>
+                <a:extLst>
+                  <a:ext uri="{0D108BD9-81ED-4DB2-BD59-A6C34878D82A}">
+                    <a16:rowId xmlns:a16="http://schemas.microsoft.com/office/drawing/2014/main" val="237001104"/>
+                  </a:ext>
+                </a:extLst>
+              </a:tr>
+              <a:tr h="370840">
+                <a:tc>
+                  <a:txBody>
+                    <a:bodyPr/>
+                    <a:lstStyle/>
+                    <a:p>
+                      <a:r>
+                        <a:rPr lang="tr-TR" dirty="0" smtClean="0"/>
+                        <a:t>51.11 V</a:t>
+                      </a:r>
+                      <a:endParaRPr lang="tr-TR" dirty="0"/>
+                    </a:p>
+                  </a:txBody>
+                  <a:tcPr/>
+                </a:tc>
+                <a:tc>
+                  <a:txBody>
+                    <a:bodyPr/>
+                    <a:lstStyle/>
+                    <a:p>
+                      <a:r>
+                        <a:rPr lang="tr-TR" dirty="0" smtClean="0"/>
+                        <a:t>-346 mV</a:t>
+                      </a:r>
+                      <a:endParaRPr lang="tr-TR" dirty="0"/>
+                    </a:p>
+                  </a:txBody>
+                  <a:tcPr/>
+                </a:tc>
+                <a:tc>
+                  <a:txBody>
+                    <a:bodyPr/>
+                    <a:lstStyle/>
+                    <a:p>
+                      <a:r>
+                        <a:rPr lang="tr-TR" dirty="0" smtClean="0"/>
+                        <a:t>-25V ± 2</a:t>
+                      </a:r>
+                      <a:endParaRPr lang="tr-TR" dirty="0"/>
+                    </a:p>
+                  </a:txBody>
+                  <a:tcPr/>
+                </a:tc>
+                <a:extLst>
+                  <a:ext uri="{0D108BD9-81ED-4DB2-BD59-A6C34878D82A}">
+                    <a16:rowId xmlns:a16="http://schemas.microsoft.com/office/drawing/2014/main" val="1754641669"/>
+                  </a:ext>
+                </a:extLst>
+              </a:tr>
+              <a:tr h="370840">
+                <a:tc>
+                  <a:txBody>
+                    <a:bodyPr/>
+                    <a:lstStyle/>
+                    <a:p>
+                      <a:r>
+                        <a:rPr lang="tr-TR" dirty="0" smtClean="0"/>
+                        <a:t>101.2 V</a:t>
+                      </a:r>
+                      <a:endParaRPr lang="tr-TR" dirty="0"/>
+                    </a:p>
+                  </a:txBody>
+                  <a:tcPr/>
+                </a:tc>
+                <a:tc>
+                  <a:txBody>
+                    <a:bodyPr/>
+                    <a:lstStyle/>
+                    <a:p>
+                      <a:r>
+                        <a:rPr lang="tr-TR" dirty="0" smtClean="0"/>
+                        <a:t>-681 mV</a:t>
+                      </a:r>
+                      <a:endParaRPr lang="tr-TR" dirty="0"/>
+                    </a:p>
+                  </a:txBody>
+                  <a:tcPr/>
+                </a:tc>
+                <a:tc>
+                  <a:txBody>
+                    <a:bodyPr/>
+                    <a:lstStyle/>
+                    <a:p>
+                      <a:r>
+                        <a:rPr lang="tr-TR" dirty="0" smtClean="0"/>
+                        <a:t>-50V </a:t>
+                      </a:r>
+                      <a:r>
+                        <a:rPr lang="tr-TR" dirty="0" smtClean="0"/>
+                        <a:t>± 2.5</a:t>
+                      </a:r>
+                      <a:endParaRPr lang="tr-TR" dirty="0"/>
+                    </a:p>
+                  </a:txBody>
+                  <a:tcPr/>
+                </a:tc>
+                <a:extLst>
+                  <a:ext uri="{0D108BD9-81ED-4DB2-BD59-A6C34878D82A}">
+                    <a16:rowId xmlns:a16="http://schemas.microsoft.com/office/drawing/2014/main" val="2063700647"/>
+                  </a:ext>
+                </a:extLst>
+              </a:tr>
+              <a:tr h="370840">
+                <a:tc>
+                  <a:txBody>
+                    <a:bodyPr/>
+                    <a:lstStyle/>
+                    <a:p>
+                      <a:r>
+                        <a:rPr lang="tr-TR" dirty="0" smtClean="0"/>
+                        <a:t>150.5 V</a:t>
+                      </a:r>
+                      <a:endParaRPr lang="tr-TR" dirty="0"/>
+                    </a:p>
+                  </a:txBody>
+                  <a:tcPr/>
+                </a:tc>
+                <a:tc>
+                  <a:txBody>
+                    <a:bodyPr/>
+                    <a:lstStyle/>
+                    <a:p>
+                      <a:r>
+                        <a:rPr lang="tr-TR" dirty="0" smtClean="0"/>
+                        <a:t>-1012</a:t>
+                      </a:r>
+                      <a:r>
+                        <a:rPr lang="tr-TR" baseline="0" dirty="0" smtClean="0"/>
+                        <a:t> mV</a:t>
+                      </a:r>
+                      <a:endParaRPr lang="tr-TR" dirty="0"/>
+                    </a:p>
+                  </a:txBody>
+                  <a:tcPr/>
+                </a:tc>
+                <a:tc>
+                  <a:txBody>
+                    <a:bodyPr/>
+                    <a:lstStyle/>
+                    <a:p>
+                      <a:r>
+                        <a:rPr lang="tr-TR" dirty="0" smtClean="0"/>
+                        <a:t>-72V </a:t>
+                      </a:r>
+                      <a:r>
+                        <a:rPr lang="tr-TR" dirty="0" smtClean="0"/>
+                        <a:t>± 3</a:t>
+                      </a:r>
+                      <a:endParaRPr lang="tr-TR" dirty="0"/>
+                    </a:p>
+                  </a:txBody>
+                  <a:tcPr/>
+                </a:tc>
+                <a:extLst>
+                  <a:ext uri="{0D108BD9-81ED-4DB2-BD59-A6C34878D82A}">
+                    <a16:rowId xmlns:a16="http://schemas.microsoft.com/office/drawing/2014/main" val="2242178881"/>
+                  </a:ext>
+                </a:extLst>
+              </a:tr>
+              <a:tr h="370840">
+                <a:tc>
+                  <a:txBody>
+                    <a:bodyPr/>
+                    <a:lstStyle/>
+                    <a:p>
+                      <a:r>
+                        <a:rPr lang="tr-TR" dirty="0" smtClean="0"/>
+                        <a:t>199.6 V</a:t>
+                      </a:r>
+                      <a:endParaRPr lang="tr-TR" dirty="0"/>
+                    </a:p>
+                  </a:txBody>
+                  <a:tcPr/>
+                </a:tc>
+                <a:tc>
+                  <a:txBody>
+                    <a:bodyPr/>
+                    <a:lstStyle/>
+                    <a:p>
+                      <a:r>
+                        <a:rPr lang="tr-TR" dirty="0" smtClean="0"/>
+                        <a:t>-1325 mV</a:t>
+                      </a:r>
+                      <a:endParaRPr lang="tr-TR" dirty="0"/>
+                    </a:p>
+                  </a:txBody>
+                  <a:tcPr/>
+                </a:tc>
+                <a:tc>
+                  <a:txBody>
+                    <a:bodyPr/>
+                    <a:lstStyle/>
+                    <a:p>
+                      <a:r>
+                        <a:rPr lang="tr-TR" dirty="0" smtClean="0"/>
+                        <a:t>-98V </a:t>
+                      </a:r>
+                      <a:r>
+                        <a:rPr lang="tr-TR" dirty="0" smtClean="0"/>
+                        <a:t>± 2.5</a:t>
+                      </a:r>
+                      <a:endParaRPr lang="tr-TR" dirty="0"/>
+                    </a:p>
+                  </a:txBody>
+                  <a:tcPr/>
+                </a:tc>
+                <a:extLst>
+                  <a:ext uri="{0D108BD9-81ED-4DB2-BD59-A6C34878D82A}">
+                    <a16:rowId xmlns:a16="http://schemas.microsoft.com/office/drawing/2014/main" val="3857915851"/>
+                  </a:ext>
+                </a:extLst>
+              </a:tr>
+            </a:tbl>
+          </a:graphicData>
+        </a:graphic>
+      </p:graphicFrame>
+      <p:pic>
+        <p:nvPicPr>
+          <p:cNvPr id="5" name="Picture 4"/>
+          <p:cNvPicPr>
+            <a:picLocks noChangeAspect="1"/>
+          </p:cNvPicPr>
+          <p:nvPr/>
+        </p:nvPicPr>
+        <p:blipFill>
+          <a:blip r:embed="rId2"/>
+          <a:stretch>
+            <a:fillRect/>
+          </a:stretch>
+        </p:blipFill>
+        <p:spPr>
+          <a:xfrm>
+            <a:off x="4333267" y="1749707"/>
+            <a:ext cx="7648575" cy="4295775"/>
+          </a:xfrm>
+          <a:prstGeom prst="rect">
+            <a:avLst/>
+          </a:prstGeom>
+        </p:spPr>
+      </p:pic>
+      <p:cxnSp>
+        <p:nvCxnSpPr>
+          <p:cNvPr id="7" name="Elbow Connector 6"/>
+          <p:cNvCxnSpPr/>
+          <p:nvPr/>
+        </p:nvCxnSpPr>
+        <p:spPr>
+          <a:xfrm>
+            <a:off x="4231178" y="864524"/>
+            <a:ext cx="4379422" cy="647035"/>
+          </a:xfrm>
+          <a:prstGeom prst="bentConnector3">
+            <a:avLst>
+              <a:gd name="adj1" fmla="val 100068"/>
+            </a:avLst>
+          </a:prstGeom>
+          <a:ln w="57150">
+            <a:tailEnd type="triangle"/>
+          </a:ln>
+        </p:spPr>
+        <p:style>
+          <a:lnRef idx="1">
+            <a:schemeClr val="accent2"/>
+          </a:lnRef>
+          <a:fillRef idx="0">
+            <a:schemeClr val="accent2"/>
+          </a:fillRef>
+          <a:effectRef idx="0">
+            <a:schemeClr val="accent2"/>
+          </a:effectRef>
+          <a:fontRef idx="minor">
+            <a:schemeClr val="tx1"/>
+          </a:fontRef>
+        </p:style>
+      </p:cxnSp>
+      <p:sp>
+        <p:nvSpPr>
+          <p:cNvPr id="10" name="Rectangle 9"/>
+          <p:cNvSpPr/>
+          <p:nvPr/>
+        </p:nvSpPr>
+        <p:spPr>
+          <a:xfrm>
+            <a:off x="332509" y="648393"/>
+            <a:ext cx="3782291" cy="5707958"/>
+          </a:xfrm>
+          <a:prstGeom prst="rect">
+            <a:avLst/>
+          </a:prstGeom>
+          <a:noFill/>
+          <a:ln w="63500">
+            <a:solidFill>
+              <a:schemeClr val="tx1"/>
+            </a:solidFill>
+            <a:prstDash val="sysDash"/>
+          </a:ln>
+        </p:spPr>
+        <p:style>
+          <a:lnRef idx="2">
+            <a:schemeClr val="accent1">
+              <a:shade val="50000"/>
+            </a:schemeClr>
+          </a:lnRef>
+          <a:fillRef idx="1">
+            <a:schemeClr val="accent1"/>
+          </a:fillRef>
+          <a:effectRef idx="0">
+            <a:schemeClr val="accent1"/>
+          </a:effectRef>
+          <a:fontRef idx="minor">
+            <a:schemeClr val="lt1"/>
+          </a:fontRef>
+        </p:style>
+        <p:txBody>
+          <a:bodyPr rtlCol="0" anchor="ctr"/>
+          <a:lstStyle/>
+          <a:p>
+            <a:pPr algn="ctr"/>
+            <a:endParaRPr lang="tr-TR"/>
+          </a:p>
+        </p:txBody>
+      </p:sp>
+      <p:sp>
+        <p:nvSpPr>
+          <p:cNvPr id="16" name="TextBox 15"/>
+          <p:cNvSpPr txBox="1"/>
+          <p:nvPr/>
+        </p:nvSpPr>
+        <p:spPr>
+          <a:xfrm>
+            <a:off x="814730" y="2945569"/>
+            <a:ext cx="2817845" cy="369332"/>
+          </a:xfrm>
+          <a:prstGeom prst="rect">
+            <a:avLst/>
+          </a:prstGeom>
+          <a:noFill/>
+        </p:spPr>
+        <p:txBody>
+          <a:bodyPr wrap="square" rtlCol="0">
+            <a:spAutoFit/>
+          </a:bodyPr>
+          <a:lstStyle/>
+          <a:p>
+            <a:r>
+              <a:rPr lang="tr-TR" dirty="0" smtClean="0"/>
+              <a:t>0.5% error at rated voltage</a:t>
+            </a:r>
+            <a:endParaRPr lang="tr-TR" dirty="0"/>
+          </a:p>
+        </p:txBody>
+      </p:sp>
+      <p:sp>
+        <p:nvSpPr>
+          <p:cNvPr id="30" name="TextBox 29"/>
+          <p:cNvSpPr txBox="1"/>
+          <p:nvPr/>
+        </p:nvSpPr>
+        <p:spPr>
+          <a:xfrm>
+            <a:off x="814730" y="5987018"/>
+            <a:ext cx="2817845" cy="369332"/>
+          </a:xfrm>
+          <a:prstGeom prst="rect">
+            <a:avLst/>
+          </a:prstGeom>
+          <a:noFill/>
+        </p:spPr>
+        <p:txBody>
+          <a:bodyPr wrap="square" rtlCol="0">
+            <a:spAutoFit/>
+          </a:bodyPr>
+          <a:lstStyle/>
+          <a:p>
+            <a:r>
+              <a:rPr lang="tr-TR" dirty="0" smtClean="0"/>
+              <a:t>0.75% error at rated voltage</a:t>
+            </a:r>
+            <a:endParaRPr lang="tr-TR" dirty="0"/>
+          </a:p>
+        </p:txBody>
+      </p:sp>
+      <p:sp>
+        <p:nvSpPr>
+          <p:cNvPr id="31" name="TextBox 30"/>
+          <p:cNvSpPr txBox="1"/>
+          <p:nvPr/>
+        </p:nvSpPr>
+        <p:spPr>
+          <a:xfrm>
+            <a:off x="6489186" y="495192"/>
+            <a:ext cx="2237792" cy="369332"/>
+          </a:xfrm>
+          <a:prstGeom prst="rect">
+            <a:avLst/>
+          </a:prstGeom>
+          <a:noFill/>
+        </p:spPr>
+        <p:txBody>
+          <a:bodyPr wrap="square" rtlCol="0">
+            <a:spAutoFit/>
+          </a:bodyPr>
+          <a:lstStyle/>
+          <a:p>
+            <a:r>
+              <a:rPr lang="tr-TR" i="1" dirty="0" smtClean="0"/>
+              <a:t>How to reduce error ?</a:t>
+            </a:r>
+            <a:endParaRPr lang="tr-TR" i="1" dirty="0"/>
+          </a:p>
+        </p:txBody>
+      </p:sp>
+    </p:spTree>
+    <p:extLst>
+      <p:ext uri="{BB962C8B-B14F-4D97-AF65-F5344CB8AC3E}">
+        <p14:creationId xmlns:p14="http://schemas.microsoft.com/office/powerpoint/2010/main" val="3082643901"/>
+      </p:ext>
+    </p:extLst>
+  </p:cSld>
+  <p:clrMapOvr>
+    <a:masterClrMapping/>
+  </p:clrMapOvr>
+  <p:timing>
+    <p:tnLst>
+      <p:par>
+        <p:cTn id="1" dur="indefinite" restart="never" nodeType="tmRoot"/>
+      </p:par>
+    </p:tnLst>
+  </p:timing>
+</p:sld>
+</file>
+
+<file path=ppt/slides/slide7.xml><?xml version="1.0" encoding="utf-8"?>
+<p:sld xmlns:a="http://schemas.openxmlformats.org/drawingml/2006/main" xmlns:r="http://schemas.openxmlformats.org/officeDocument/2006/relationships" xmlns:p="http://schemas.openxmlformats.org/presentationml/2006/main">
+  <p:cSld>
+    <p:spTree>
+      <p:nvGrpSpPr>
+        <p:cNvPr id="1" name=""/>
+        <p:cNvGrpSpPr/>
+        <p:nvPr/>
+      </p:nvGrpSpPr>
+      <p:grpSpPr>
+        <a:xfrm>
+          <a:off x="0" y="0"/>
+          <a:ext cx="0" cy="0"/>
+          <a:chOff x="0" y="0"/>
+          <a:chExt cx="0" cy="0"/>
+        </a:xfrm>
+      </p:grpSpPr>
+      <p:sp>
+        <p:nvSpPr>
+          <p:cNvPr id="4" name="Slide Number Placeholder 3"/>
+          <p:cNvSpPr>
+            <a:spLocks noGrp="1"/>
+          </p:cNvSpPr>
+          <p:nvPr>
+            <p:ph type="sldNum" sz="quarter" idx="12"/>
+          </p:nvPr>
+        </p:nvSpPr>
+        <p:spPr/>
+        <p:txBody>
+          <a:bodyPr/>
+          <a:lstStyle/>
+          <a:p>
+            <a:fld id="{178508F5-8E49-4F57-B165-331DE2AB85B8}" type="slidenum">
+              <a:rPr lang="tr-TR" sz="1800" smtClean="0"/>
+              <a:t>7</a:t>
+            </a:fld>
+            <a:endParaRPr lang="tr-TR" sz="1800" dirty="0"/>
+          </a:p>
+        </p:txBody>
+      </p:sp>
+      <p:sp>
+        <p:nvSpPr>
+          <p:cNvPr id="3" name="TextBox 2"/>
+          <p:cNvSpPr txBox="1"/>
+          <p:nvPr/>
+        </p:nvSpPr>
+        <p:spPr>
+          <a:xfrm>
+            <a:off x="246663" y="93529"/>
+            <a:ext cx="6477987" cy="461665"/>
+          </a:xfrm>
+          <a:prstGeom prst="rect">
+            <a:avLst/>
+          </a:prstGeom>
+          <a:noFill/>
+        </p:spPr>
+        <p:txBody>
+          <a:bodyPr wrap="square" rtlCol="0">
+            <a:spAutoFit/>
+          </a:bodyPr>
+          <a:lstStyle/>
+          <a:p>
+            <a:r>
+              <a:rPr lang="tr-TR" sz="2400" b="1" dirty="0" smtClean="0"/>
+              <a:t>New Board Designs – Connector Selection</a:t>
+            </a:r>
+            <a:endParaRPr lang="tr-TR" sz="2400" b="1" dirty="0"/>
+          </a:p>
+        </p:txBody>
+      </p:sp>
+      <p:pic>
+        <p:nvPicPr>
+          <p:cNvPr id="6" name="Picture 5"/>
+          <p:cNvPicPr>
+            <a:picLocks noChangeAspect="1"/>
+          </p:cNvPicPr>
+          <p:nvPr/>
+        </p:nvPicPr>
+        <p:blipFill>
+          <a:blip r:embed="rId2"/>
+          <a:stretch>
+            <a:fillRect/>
+          </a:stretch>
+        </p:blipFill>
+        <p:spPr>
+          <a:xfrm>
+            <a:off x="5654612" y="758537"/>
+            <a:ext cx="5547774" cy="2839055"/>
+          </a:xfrm>
+          <a:prstGeom prst="rect">
+            <a:avLst/>
+          </a:prstGeom>
+        </p:spPr>
+      </p:pic>
+      <p:sp>
+        <p:nvSpPr>
+          <p:cNvPr id="13" name="TextBox 12"/>
+          <p:cNvSpPr txBox="1"/>
+          <p:nvPr/>
+        </p:nvSpPr>
+        <p:spPr>
+          <a:xfrm>
+            <a:off x="7429910" y="3606611"/>
+            <a:ext cx="2237792" cy="369332"/>
+          </a:xfrm>
+          <a:prstGeom prst="rect">
+            <a:avLst/>
+          </a:prstGeom>
+          <a:noFill/>
+        </p:spPr>
+        <p:txBody>
+          <a:bodyPr wrap="square" rtlCol="0">
+            <a:spAutoFit/>
+          </a:bodyPr>
+          <a:lstStyle/>
+          <a:p>
+            <a:r>
+              <a:rPr lang="tr-TR" dirty="0" smtClean="0"/>
+              <a:t>GaN Systems Solution</a:t>
+            </a:r>
+            <a:endParaRPr lang="tr-TR" dirty="0"/>
+          </a:p>
+        </p:txBody>
+      </p:sp>
+      <p:pic>
+        <p:nvPicPr>
+          <p:cNvPr id="8" name="Picture 7"/>
+          <p:cNvPicPr>
+            <a:picLocks noChangeAspect="1"/>
+          </p:cNvPicPr>
+          <p:nvPr/>
+        </p:nvPicPr>
+        <p:blipFill>
+          <a:blip r:embed="rId3"/>
+          <a:stretch>
+            <a:fillRect/>
+          </a:stretch>
+        </p:blipFill>
+        <p:spPr>
+          <a:xfrm>
+            <a:off x="572092" y="758537"/>
+            <a:ext cx="2799845" cy="2733068"/>
+          </a:xfrm>
+          <a:prstGeom prst="rect">
+            <a:avLst/>
+          </a:prstGeom>
+        </p:spPr>
+      </p:pic>
+      <p:sp>
+        <p:nvSpPr>
+          <p:cNvPr id="18" name="TextBox 17"/>
+          <p:cNvSpPr txBox="1"/>
+          <p:nvPr/>
+        </p:nvSpPr>
+        <p:spPr>
+          <a:xfrm>
+            <a:off x="753405" y="3491605"/>
+            <a:ext cx="2237792" cy="369332"/>
+          </a:xfrm>
+          <a:prstGeom prst="rect">
+            <a:avLst/>
+          </a:prstGeom>
+          <a:noFill/>
+        </p:spPr>
+        <p:txBody>
+          <a:bodyPr wrap="square" rtlCol="0">
+            <a:spAutoFit/>
+          </a:bodyPr>
+          <a:lstStyle/>
+          <a:p>
+            <a:r>
+              <a:rPr lang="tr-TR" dirty="0" smtClean="0"/>
+              <a:t>0.906 mm diameter</a:t>
+            </a:r>
+            <a:endParaRPr lang="tr-TR" dirty="0"/>
+          </a:p>
+        </p:txBody>
+      </p:sp>
+      <p:cxnSp>
+        <p:nvCxnSpPr>
+          <p:cNvPr id="12" name="Straight Arrow Connector 11"/>
+          <p:cNvCxnSpPr/>
+          <p:nvPr/>
+        </p:nvCxnSpPr>
+        <p:spPr>
+          <a:xfrm>
+            <a:off x="3624349" y="2419004"/>
+            <a:ext cx="1911927" cy="0"/>
+          </a:xfrm>
+          <a:prstGeom prst="straightConnector1">
+            <a:avLst/>
+          </a:prstGeom>
+          <a:ln w="57150">
+            <a:headEnd type="triangle"/>
+            <a:tailEnd type="triangle"/>
+          </a:ln>
+        </p:spPr>
+        <p:style>
+          <a:lnRef idx="1">
+            <a:schemeClr val="accent1"/>
+          </a:lnRef>
+          <a:fillRef idx="0">
+            <a:schemeClr val="accent1"/>
+          </a:fillRef>
+          <a:effectRef idx="0">
+            <a:schemeClr val="accent1"/>
+          </a:effectRef>
+          <a:fontRef idx="minor">
+            <a:schemeClr val="tx1"/>
+          </a:fontRef>
+        </p:style>
+      </p:cxnSp>
+      <p:cxnSp>
+        <p:nvCxnSpPr>
+          <p:cNvPr id="19" name="Straight Arrow Connector 18"/>
+          <p:cNvCxnSpPr/>
+          <p:nvPr/>
+        </p:nvCxnSpPr>
+        <p:spPr>
+          <a:xfrm flipV="1">
+            <a:off x="4613564" y="2419005"/>
+            <a:ext cx="8312" cy="1737359"/>
+          </a:xfrm>
+          <a:prstGeom prst="straightConnector1">
+            <a:avLst/>
+          </a:prstGeom>
+          <a:ln w="57150">
+            <a:headEnd type="triangle" w="med" len="med"/>
+            <a:tailEnd type="none" w="med" len="med"/>
+          </a:ln>
+        </p:spPr>
+        <p:style>
+          <a:lnRef idx="1">
+            <a:schemeClr val="accent1"/>
+          </a:lnRef>
+          <a:fillRef idx="0">
+            <a:schemeClr val="accent1"/>
+          </a:fillRef>
+          <a:effectRef idx="0">
+            <a:schemeClr val="accent1"/>
+          </a:effectRef>
+          <a:fontRef idx="minor">
+            <a:schemeClr val="tx1"/>
+          </a:fontRef>
+        </p:style>
+      </p:cxnSp>
+      <p:sp>
+        <p:nvSpPr>
+          <p:cNvPr id="20" name="TextBox 19"/>
+          <p:cNvSpPr txBox="1"/>
+          <p:nvPr/>
+        </p:nvSpPr>
+        <p:spPr>
+          <a:xfrm>
+            <a:off x="3233650" y="4282815"/>
+            <a:ext cx="2776451" cy="646331"/>
+          </a:xfrm>
+          <a:prstGeom prst="rect">
+            <a:avLst/>
+          </a:prstGeom>
+          <a:noFill/>
+        </p:spPr>
+        <p:txBody>
+          <a:bodyPr wrap="square" rtlCol="0">
+            <a:spAutoFit/>
+          </a:bodyPr>
+          <a:lstStyle/>
+          <a:p>
+            <a:pPr algn="ctr"/>
+            <a:r>
+              <a:rPr lang="tr-TR" dirty="0" smtClean="0"/>
+              <a:t>8 vias with 0.95 mm hole diameter</a:t>
+            </a:r>
+            <a:endParaRPr lang="tr-TR" dirty="0"/>
+          </a:p>
+        </p:txBody>
+      </p:sp>
+      <p:pic>
+        <p:nvPicPr>
+          <p:cNvPr id="1026" name="Picture 2" descr="tick symbol ile ilgili görsel sonucu"/>
+          <p:cNvPicPr>
+            <a:picLocks noChangeAspect="1" noChangeArrowheads="1"/>
+          </p:cNvPicPr>
+          <p:nvPr/>
+        </p:nvPicPr>
+        <p:blipFill rotWithShape="1">
+          <a:blip r:embed="rId4" cstate="print">
+            <a:extLst>
+              <a:ext uri="{28A0092B-C50C-407E-A947-70E740481C1C}">
+                <a14:useLocalDpi xmlns:a14="http://schemas.microsoft.com/office/drawing/2010/main" val="0"/>
+              </a:ext>
+            </a:extLst>
+          </a:blip>
+          <a:srcRect l="14853" t="13526" r="5071" b="26162"/>
+          <a:stretch/>
+        </p:blipFill>
+        <p:spPr bwMode="auto">
+          <a:xfrm>
+            <a:off x="5907314" y="4339771"/>
+            <a:ext cx="724552" cy="589375"/>
+          </a:xfrm>
+          <a:prstGeom prst="rect">
+            <a:avLst/>
+          </a:prstGeom>
+          <a:noFill/>
+          <a:extLst>
+            <a:ext uri="{909E8E84-426E-40DD-AFC4-6F175D3DCCD1}">
+              <a14:hiddenFill xmlns:a14="http://schemas.microsoft.com/office/drawing/2010/main">
+                <a:solidFill>
+                  <a:srgbClr val="FFFFFF"/>
+                </a:solidFill>
+              </a14:hiddenFill>
+            </a:ext>
+          </a:extLst>
+        </p:spPr>
+      </p:pic>
+    </p:spTree>
+    <p:extLst>
+      <p:ext uri="{BB962C8B-B14F-4D97-AF65-F5344CB8AC3E}">
+        <p14:creationId xmlns:p14="http://schemas.microsoft.com/office/powerpoint/2010/main" val="1297108307"/>
       </p:ext>
     </p:extLst>
   </p:cSld>

</xml_diff>